<commit_message>
add russian version readme
</commit_message>
<xml_diff>
--- a/_legal_documentation/преддипломная практика/TimofeevDA.pptx
+++ b/_legal_documentation/преддипломная практика/TimofeevDA.pptx
@@ -5,20 +5,21 @@
     <p:sldMasterId id="2147483648" r:id="rId1"/>
   </p:sldMasterIdLst>
   <p:notesMasterIdLst>
-    <p:notesMasterId r:id="rId13"/>
+    <p:notesMasterId r:id="rId14"/>
   </p:notesMasterIdLst>
   <p:sldIdLst>
     <p:sldId id="256" r:id="rId2"/>
     <p:sldId id="262" r:id="rId3"/>
     <p:sldId id="263" r:id="rId4"/>
     <p:sldId id="268" r:id="rId5"/>
-    <p:sldId id="269" r:id="rId6"/>
-    <p:sldId id="270" r:id="rId7"/>
-    <p:sldId id="271" r:id="rId8"/>
-    <p:sldId id="272" r:id="rId9"/>
-    <p:sldId id="264" r:id="rId10"/>
-    <p:sldId id="265" r:id="rId11"/>
-    <p:sldId id="267" r:id="rId12"/>
+    <p:sldId id="270" r:id="rId6"/>
+    <p:sldId id="273" r:id="rId7"/>
+    <p:sldId id="272" r:id="rId8"/>
+    <p:sldId id="275" r:id="rId9"/>
+    <p:sldId id="274" r:id="rId10"/>
+    <p:sldId id="264" r:id="rId11"/>
+    <p:sldId id="265" r:id="rId12"/>
+    <p:sldId id="267" r:id="rId13"/>
   </p:sldIdLst>
   <p:sldSz cx="9144000" cy="6858000" type="screen4x3"/>
   <p:notesSz cx="6858000" cy="9144000"/>
@@ -275,7 +276,7 @@
               <a:pPr>
                 <a:defRPr/>
               </a:pPr>
-              <a:t>19.05.2020</a:t>
+              <a:t>18.06.2020</a:t>
             </a:fld>
             <a:endParaRPr lang="ru-RU"/>
           </a:p>
@@ -602,6 +603,1000 @@
 </p:notesMaster>
 </file>
 
+<file path=ppt/notesSlides/notesSlide1.xml><?xml version="1.0" encoding="utf-8"?>
+<p:notes xmlns:a="http://schemas.openxmlformats.org/drawingml/2006/main" xmlns:r="http://schemas.openxmlformats.org/officeDocument/2006/relationships" xmlns:p="http://schemas.openxmlformats.org/presentationml/2006/main">
+  <p:cSld>
+    <p:spTree>
+      <p:nvGrpSpPr>
+        <p:cNvPr id="1" name=""/>
+        <p:cNvGrpSpPr/>
+        <p:nvPr/>
+      </p:nvGrpSpPr>
+      <p:grpSpPr>
+        <a:xfrm>
+          <a:off x="0" y="0"/>
+          <a:ext cx="0" cy="0"/>
+          <a:chOff x="0" y="0"/>
+          <a:chExt cx="0" cy="0"/>
+        </a:xfrm>
+      </p:grpSpPr>
+      <p:sp>
+        <p:nvSpPr>
+          <p:cNvPr id="2" name="Образ слайда 1"/>
+          <p:cNvSpPr>
+            <a:spLocks noGrp="1" noRot="1" noChangeAspect="1"/>
+          </p:cNvSpPr>
+          <p:nvPr>
+            <p:ph type="sldImg"/>
+          </p:nvPr>
+        </p:nvSpPr>
+        <p:spPr/>
+      </p:sp>
+      <p:sp>
+        <p:nvSpPr>
+          <p:cNvPr id="3" name="Заметки 2"/>
+          <p:cNvSpPr>
+            <a:spLocks noGrp="1"/>
+          </p:cNvSpPr>
+          <p:nvPr>
+            <p:ph type="body" idx="1"/>
+          </p:nvPr>
+        </p:nvSpPr>
+        <p:spPr/>
+        <p:txBody>
+          <a:bodyPr/>
+          <a:lstStyle/>
+          <a:p>
+            <a:r>
+              <a:rPr lang="ru-RU" dirty="0" smtClean="0"/>
+              <a:t>Здравствуйте уважаемая комиссия.</a:t>
+            </a:r>
+          </a:p>
+          <a:p>
+            <a:r>
+              <a:rPr lang="ru-RU" dirty="0" smtClean="0"/>
+              <a:t>Представляю ВКР на тему Разработка алгоритма централизованного управления автомобилями для систем </a:t>
+            </a:r>
+            <a:r>
+              <a:rPr lang="ru-RU" dirty="0" err="1" smtClean="0"/>
+              <a:t>автоведения</a:t>
+            </a:r>
+            <a:r>
+              <a:rPr lang="ru-RU" dirty="0" smtClean="0"/>
+              <a:t>.</a:t>
+            </a:r>
+            <a:endParaRPr lang="ru-RU" dirty="0"/>
+          </a:p>
+        </p:txBody>
+      </p:sp>
+      <p:sp>
+        <p:nvSpPr>
+          <p:cNvPr id="4" name="Номер слайда 3"/>
+          <p:cNvSpPr>
+            <a:spLocks noGrp="1"/>
+          </p:cNvSpPr>
+          <p:nvPr>
+            <p:ph type="sldNum" sz="quarter" idx="10"/>
+          </p:nvPr>
+        </p:nvSpPr>
+        <p:spPr/>
+        <p:txBody>
+          <a:bodyPr/>
+          <a:lstStyle/>
+          <a:p>
+            <a:pPr>
+              <a:defRPr/>
+            </a:pPr>
+            <a:fld id="{5DDD994F-3BAF-42D9-A83D-4EE4A2B12B5A}" type="slidenum">
+              <a:rPr lang="ru-RU" smtClean="0"/>
+              <a:pPr>
+                <a:defRPr/>
+              </a:pPr>
+              <a:t>1</a:t>
+            </a:fld>
+            <a:endParaRPr lang="ru-RU"/>
+          </a:p>
+        </p:txBody>
+      </p:sp>
+    </p:spTree>
+    <p:extLst>
+      <p:ext uri="{BB962C8B-B14F-4D97-AF65-F5344CB8AC3E}">
+        <p14:creationId xmlns:p14="http://schemas.microsoft.com/office/powerpoint/2010/main" val="898162824"/>
+      </p:ext>
+    </p:extLst>
+  </p:cSld>
+  <p:clrMapOvr>
+    <a:masterClrMapping/>
+  </p:clrMapOvr>
+</p:notes>
+</file>
+
+<file path=ppt/notesSlides/notesSlide2.xml><?xml version="1.0" encoding="utf-8"?>
+<p:notes xmlns:a="http://schemas.openxmlformats.org/drawingml/2006/main" xmlns:r="http://schemas.openxmlformats.org/officeDocument/2006/relationships" xmlns:p="http://schemas.openxmlformats.org/presentationml/2006/main">
+  <p:cSld>
+    <p:spTree>
+      <p:nvGrpSpPr>
+        <p:cNvPr id="1" name=""/>
+        <p:cNvGrpSpPr/>
+        <p:nvPr/>
+      </p:nvGrpSpPr>
+      <p:grpSpPr>
+        <a:xfrm>
+          <a:off x="0" y="0"/>
+          <a:ext cx="0" cy="0"/>
+          <a:chOff x="0" y="0"/>
+          <a:chExt cx="0" cy="0"/>
+        </a:xfrm>
+      </p:grpSpPr>
+      <p:sp>
+        <p:nvSpPr>
+          <p:cNvPr id="2" name="Образ слайда 1"/>
+          <p:cNvSpPr>
+            <a:spLocks noGrp="1" noRot="1" noChangeAspect="1"/>
+          </p:cNvSpPr>
+          <p:nvPr>
+            <p:ph type="sldImg"/>
+          </p:nvPr>
+        </p:nvSpPr>
+        <p:spPr/>
+      </p:sp>
+      <p:sp>
+        <p:nvSpPr>
+          <p:cNvPr id="3" name="Заметки 2"/>
+          <p:cNvSpPr>
+            <a:spLocks noGrp="1"/>
+          </p:cNvSpPr>
+          <p:nvPr>
+            <p:ph type="body" idx="1"/>
+          </p:nvPr>
+        </p:nvSpPr>
+        <p:spPr/>
+        <p:txBody>
+          <a:bodyPr/>
+          <a:lstStyle/>
+          <a:p>
+            <a:r>
+              <a:rPr lang="ru-RU" dirty="0" smtClean="0"/>
+              <a:t>Проблема: пробки на дорогах.</a:t>
+            </a:r>
+          </a:p>
+          <a:p>
+            <a:r>
+              <a:rPr lang="ru-RU" dirty="0" smtClean="0"/>
+              <a:t>Причина проблемы: человеческий фактор (а именно: низкая организованность людей, например: людям очень трудно одновременно начать ехать на зеленый свет светофора)</a:t>
+            </a:r>
+          </a:p>
+          <a:p>
+            <a:r>
+              <a:rPr lang="ru-RU" dirty="0" smtClean="0"/>
+              <a:t>Решение проблемы: автопилотируемые машины с централизованной раздачей маршрутов движения.</a:t>
+            </a:r>
+            <a:endParaRPr lang="ru-RU" dirty="0"/>
+          </a:p>
+        </p:txBody>
+      </p:sp>
+      <p:sp>
+        <p:nvSpPr>
+          <p:cNvPr id="4" name="Номер слайда 3"/>
+          <p:cNvSpPr>
+            <a:spLocks noGrp="1"/>
+          </p:cNvSpPr>
+          <p:nvPr>
+            <p:ph type="sldNum" sz="quarter" idx="10"/>
+          </p:nvPr>
+        </p:nvSpPr>
+        <p:spPr/>
+        <p:txBody>
+          <a:bodyPr/>
+          <a:lstStyle/>
+          <a:p>
+            <a:pPr>
+              <a:defRPr/>
+            </a:pPr>
+            <a:fld id="{5DDD994F-3BAF-42D9-A83D-4EE4A2B12B5A}" type="slidenum">
+              <a:rPr lang="ru-RU" smtClean="0"/>
+              <a:pPr>
+                <a:defRPr/>
+              </a:pPr>
+              <a:t>2</a:t>
+            </a:fld>
+            <a:endParaRPr lang="ru-RU"/>
+          </a:p>
+        </p:txBody>
+      </p:sp>
+    </p:spTree>
+    <p:extLst>
+      <p:ext uri="{BB962C8B-B14F-4D97-AF65-F5344CB8AC3E}">
+        <p14:creationId xmlns:p14="http://schemas.microsoft.com/office/powerpoint/2010/main" val="3225326888"/>
+      </p:ext>
+    </p:extLst>
+  </p:cSld>
+  <p:clrMapOvr>
+    <a:masterClrMapping/>
+  </p:clrMapOvr>
+</p:notes>
+</file>
+
+<file path=ppt/notesSlides/notesSlide3.xml><?xml version="1.0" encoding="utf-8"?>
+<p:notes xmlns:a="http://schemas.openxmlformats.org/drawingml/2006/main" xmlns:r="http://schemas.openxmlformats.org/officeDocument/2006/relationships" xmlns:p="http://schemas.openxmlformats.org/presentationml/2006/main">
+  <p:cSld>
+    <p:spTree>
+      <p:nvGrpSpPr>
+        <p:cNvPr id="1" name=""/>
+        <p:cNvGrpSpPr/>
+        <p:nvPr/>
+      </p:nvGrpSpPr>
+      <p:grpSpPr>
+        <a:xfrm>
+          <a:off x="0" y="0"/>
+          <a:ext cx="0" cy="0"/>
+          <a:chOff x="0" y="0"/>
+          <a:chExt cx="0" cy="0"/>
+        </a:xfrm>
+      </p:grpSpPr>
+      <p:sp>
+        <p:nvSpPr>
+          <p:cNvPr id="2" name="Образ слайда 1"/>
+          <p:cNvSpPr>
+            <a:spLocks noGrp="1" noRot="1" noChangeAspect="1"/>
+          </p:cNvSpPr>
+          <p:nvPr>
+            <p:ph type="sldImg"/>
+          </p:nvPr>
+        </p:nvSpPr>
+        <p:spPr/>
+      </p:sp>
+      <p:sp>
+        <p:nvSpPr>
+          <p:cNvPr id="3" name="Заметки 2"/>
+          <p:cNvSpPr>
+            <a:spLocks noGrp="1"/>
+          </p:cNvSpPr>
+          <p:nvPr>
+            <p:ph type="body" idx="1"/>
+          </p:nvPr>
+        </p:nvSpPr>
+        <p:spPr/>
+        <p:txBody>
+          <a:bodyPr/>
+          <a:lstStyle/>
+          <a:p>
+            <a:endParaRPr lang="ru-RU" dirty="0"/>
+          </a:p>
+        </p:txBody>
+      </p:sp>
+      <p:sp>
+        <p:nvSpPr>
+          <p:cNvPr id="4" name="Номер слайда 3"/>
+          <p:cNvSpPr>
+            <a:spLocks noGrp="1"/>
+          </p:cNvSpPr>
+          <p:nvPr>
+            <p:ph type="sldNum" sz="quarter" idx="10"/>
+          </p:nvPr>
+        </p:nvSpPr>
+        <p:spPr/>
+        <p:txBody>
+          <a:bodyPr/>
+          <a:lstStyle/>
+          <a:p>
+            <a:pPr>
+              <a:defRPr/>
+            </a:pPr>
+            <a:fld id="{5DDD994F-3BAF-42D9-A83D-4EE4A2B12B5A}" type="slidenum">
+              <a:rPr lang="ru-RU" smtClean="0"/>
+              <a:pPr>
+                <a:defRPr/>
+              </a:pPr>
+              <a:t>3</a:t>
+            </a:fld>
+            <a:endParaRPr lang="ru-RU"/>
+          </a:p>
+        </p:txBody>
+      </p:sp>
+    </p:spTree>
+    <p:extLst>
+      <p:ext uri="{BB962C8B-B14F-4D97-AF65-F5344CB8AC3E}">
+        <p14:creationId xmlns:p14="http://schemas.microsoft.com/office/powerpoint/2010/main" val="1081247024"/>
+      </p:ext>
+    </p:extLst>
+  </p:cSld>
+  <p:clrMapOvr>
+    <a:masterClrMapping/>
+  </p:clrMapOvr>
+</p:notes>
+</file>
+
+<file path=ppt/notesSlides/notesSlide4.xml><?xml version="1.0" encoding="utf-8"?>
+<p:notes xmlns:a="http://schemas.openxmlformats.org/drawingml/2006/main" xmlns:r="http://schemas.openxmlformats.org/officeDocument/2006/relationships" xmlns:p="http://schemas.openxmlformats.org/presentationml/2006/main">
+  <p:cSld>
+    <p:spTree>
+      <p:nvGrpSpPr>
+        <p:cNvPr id="1" name=""/>
+        <p:cNvGrpSpPr/>
+        <p:nvPr/>
+      </p:nvGrpSpPr>
+      <p:grpSpPr>
+        <a:xfrm>
+          <a:off x="0" y="0"/>
+          <a:ext cx="0" cy="0"/>
+          <a:chOff x="0" y="0"/>
+          <a:chExt cx="0" cy="0"/>
+        </a:xfrm>
+      </p:grpSpPr>
+      <p:sp>
+        <p:nvSpPr>
+          <p:cNvPr id="2" name="Образ слайда 1"/>
+          <p:cNvSpPr>
+            <a:spLocks noGrp="1" noRot="1" noChangeAspect="1"/>
+          </p:cNvSpPr>
+          <p:nvPr>
+            <p:ph type="sldImg"/>
+          </p:nvPr>
+        </p:nvSpPr>
+        <p:spPr/>
+      </p:sp>
+      <p:sp>
+        <p:nvSpPr>
+          <p:cNvPr id="3" name="Заметки 2"/>
+          <p:cNvSpPr>
+            <a:spLocks noGrp="1"/>
+          </p:cNvSpPr>
+          <p:nvPr>
+            <p:ph type="body" idx="1"/>
+          </p:nvPr>
+        </p:nvSpPr>
+        <p:spPr/>
+        <p:txBody>
+          <a:bodyPr/>
+          <a:lstStyle/>
+          <a:p>
+            <a:r>
+              <a:rPr lang="ru-RU" dirty="0" smtClean="0"/>
+              <a:t>Для выполнения поставленных задач был разработан алгоритм:</a:t>
+            </a:r>
+            <a:endParaRPr lang="ru-RU" dirty="0"/>
+          </a:p>
+        </p:txBody>
+      </p:sp>
+      <p:sp>
+        <p:nvSpPr>
+          <p:cNvPr id="4" name="Номер слайда 3"/>
+          <p:cNvSpPr>
+            <a:spLocks noGrp="1"/>
+          </p:cNvSpPr>
+          <p:nvPr>
+            <p:ph type="sldNum" sz="quarter" idx="10"/>
+          </p:nvPr>
+        </p:nvSpPr>
+        <p:spPr/>
+        <p:txBody>
+          <a:bodyPr/>
+          <a:lstStyle/>
+          <a:p>
+            <a:pPr>
+              <a:defRPr/>
+            </a:pPr>
+            <a:fld id="{5DDD994F-3BAF-42D9-A83D-4EE4A2B12B5A}" type="slidenum">
+              <a:rPr lang="ru-RU" smtClean="0"/>
+              <a:pPr>
+                <a:defRPr/>
+              </a:pPr>
+              <a:t>5</a:t>
+            </a:fld>
+            <a:endParaRPr lang="ru-RU"/>
+          </a:p>
+        </p:txBody>
+      </p:sp>
+    </p:spTree>
+    <p:extLst>
+      <p:ext uri="{BB962C8B-B14F-4D97-AF65-F5344CB8AC3E}">
+        <p14:creationId xmlns:p14="http://schemas.microsoft.com/office/powerpoint/2010/main" val="3108199505"/>
+      </p:ext>
+    </p:extLst>
+  </p:cSld>
+  <p:clrMapOvr>
+    <a:masterClrMapping/>
+  </p:clrMapOvr>
+</p:notes>
+</file>
+
+<file path=ppt/notesSlides/notesSlide5.xml><?xml version="1.0" encoding="utf-8"?>
+<p:notes xmlns:a="http://schemas.openxmlformats.org/drawingml/2006/main" xmlns:r="http://schemas.openxmlformats.org/officeDocument/2006/relationships" xmlns:p="http://schemas.openxmlformats.org/presentationml/2006/main">
+  <p:cSld>
+    <p:spTree>
+      <p:nvGrpSpPr>
+        <p:cNvPr id="1" name=""/>
+        <p:cNvGrpSpPr/>
+        <p:nvPr/>
+      </p:nvGrpSpPr>
+      <p:grpSpPr>
+        <a:xfrm>
+          <a:off x="0" y="0"/>
+          <a:ext cx="0" cy="0"/>
+          <a:chOff x="0" y="0"/>
+          <a:chExt cx="0" cy="0"/>
+        </a:xfrm>
+      </p:grpSpPr>
+      <p:sp>
+        <p:nvSpPr>
+          <p:cNvPr id="2" name="Образ слайда 1"/>
+          <p:cNvSpPr>
+            <a:spLocks noGrp="1" noRot="1" noChangeAspect="1"/>
+          </p:cNvSpPr>
+          <p:nvPr>
+            <p:ph type="sldImg"/>
+          </p:nvPr>
+        </p:nvSpPr>
+        <p:spPr/>
+      </p:sp>
+      <p:sp>
+        <p:nvSpPr>
+          <p:cNvPr id="3" name="Заметки 2"/>
+          <p:cNvSpPr>
+            <a:spLocks noGrp="1"/>
+          </p:cNvSpPr>
+          <p:nvPr>
+            <p:ph type="body" idx="1"/>
+          </p:nvPr>
+        </p:nvSpPr>
+        <p:spPr/>
+        <p:txBody>
+          <a:bodyPr/>
+          <a:lstStyle/>
+          <a:p>
+            <a:r>
+              <a:rPr lang="ru-RU" dirty="0" smtClean="0"/>
+              <a:t>Пространственно-временной означает, что алгоритм хранит положение каждой машины в каждый момент времени. Это позволяет</a:t>
+            </a:r>
+          </a:p>
+          <a:p>
+            <a:r>
+              <a:rPr lang="ru-RU" dirty="0" smtClean="0"/>
+              <a:t>	во первых) объезжать не только стационарные препятствия, но и динамические</a:t>
+            </a:r>
+          </a:p>
+          <a:p>
+            <a:r>
+              <a:rPr lang="ru-RU" dirty="0" smtClean="0"/>
+              <a:t>	во вторых) это позволяет найти оптимальный путь, так как можно планировать маршрут на протяжении всего движения машины.</a:t>
+            </a:r>
+            <a:endParaRPr lang="ru-RU" dirty="0"/>
+          </a:p>
+        </p:txBody>
+      </p:sp>
+      <p:sp>
+        <p:nvSpPr>
+          <p:cNvPr id="4" name="Номер слайда 3"/>
+          <p:cNvSpPr>
+            <a:spLocks noGrp="1"/>
+          </p:cNvSpPr>
+          <p:nvPr>
+            <p:ph type="sldNum" sz="quarter" idx="10"/>
+          </p:nvPr>
+        </p:nvSpPr>
+        <p:spPr/>
+        <p:txBody>
+          <a:bodyPr/>
+          <a:lstStyle/>
+          <a:p>
+            <a:pPr>
+              <a:defRPr/>
+            </a:pPr>
+            <a:fld id="{5DDD994F-3BAF-42D9-A83D-4EE4A2B12B5A}" type="slidenum">
+              <a:rPr lang="ru-RU" smtClean="0"/>
+              <a:pPr>
+                <a:defRPr/>
+              </a:pPr>
+              <a:t>6</a:t>
+            </a:fld>
+            <a:endParaRPr lang="ru-RU"/>
+          </a:p>
+        </p:txBody>
+      </p:sp>
+    </p:spTree>
+    <p:extLst>
+      <p:ext uri="{BB962C8B-B14F-4D97-AF65-F5344CB8AC3E}">
+        <p14:creationId xmlns:p14="http://schemas.microsoft.com/office/powerpoint/2010/main" val="720196905"/>
+      </p:ext>
+    </p:extLst>
+  </p:cSld>
+  <p:clrMapOvr>
+    <a:masterClrMapping/>
+  </p:clrMapOvr>
+</p:notes>
+</file>
+
+<file path=ppt/notesSlides/notesSlide6.xml><?xml version="1.0" encoding="utf-8"?>
+<p:notes xmlns:a="http://schemas.openxmlformats.org/drawingml/2006/main" xmlns:r="http://schemas.openxmlformats.org/officeDocument/2006/relationships" xmlns:p="http://schemas.openxmlformats.org/presentationml/2006/main">
+  <p:cSld>
+    <p:spTree>
+      <p:nvGrpSpPr>
+        <p:cNvPr id="1" name=""/>
+        <p:cNvGrpSpPr/>
+        <p:nvPr/>
+      </p:nvGrpSpPr>
+      <p:grpSpPr>
+        <a:xfrm>
+          <a:off x="0" y="0"/>
+          <a:ext cx="0" cy="0"/>
+          <a:chOff x="0" y="0"/>
+          <a:chExt cx="0" cy="0"/>
+        </a:xfrm>
+      </p:grpSpPr>
+      <p:sp>
+        <p:nvSpPr>
+          <p:cNvPr id="2" name="Образ слайда 1"/>
+          <p:cNvSpPr>
+            <a:spLocks noGrp="1" noRot="1" noChangeAspect="1"/>
+          </p:cNvSpPr>
+          <p:nvPr>
+            <p:ph type="sldImg"/>
+          </p:nvPr>
+        </p:nvSpPr>
+        <p:spPr/>
+      </p:sp>
+      <p:sp>
+        <p:nvSpPr>
+          <p:cNvPr id="3" name="Заметки 2"/>
+          <p:cNvSpPr>
+            <a:spLocks noGrp="1"/>
+          </p:cNvSpPr>
+          <p:nvPr>
+            <p:ph type="body" idx="1"/>
+          </p:nvPr>
+        </p:nvSpPr>
+        <p:spPr/>
+        <p:txBody>
+          <a:bodyPr/>
+          <a:lstStyle/>
+          <a:p>
+            <a:r>
+              <a:rPr lang="ru-RU" dirty="0" err="1" smtClean="0"/>
+              <a:t>АСтар</a:t>
+            </a:r>
+            <a:r>
+              <a:rPr lang="ru-RU" dirty="0" smtClean="0"/>
+              <a:t> с приоритетом обхода. За основу взят стандартный алгоритм быстрого поиска кратчайшего пути </a:t>
+            </a:r>
+            <a:r>
+              <a:rPr lang="ru-RU" dirty="0" err="1" smtClean="0"/>
+              <a:t>АСтар</a:t>
+            </a:r>
+            <a:r>
+              <a:rPr lang="ru-RU" dirty="0" smtClean="0"/>
+              <a:t>. Этот алгоритм возвращает первое найденное неплохое решение. </a:t>
+            </a:r>
+            <a:r>
+              <a:rPr lang="ru-RU" dirty="0" err="1" smtClean="0"/>
+              <a:t>АСтар</a:t>
+            </a:r>
+            <a:r>
+              <a:rPr lang="ru-RU" dirty="0" smtClean="0"/>
+              <a:t> в первую очередь перебирает узлы с наименьшим весом. Вес узла складывается из пройденного расстояния и примерного расстояния до цели. Примерное расстояние оценивает эвристическая функция.</a:t>
+            </a:r>
+            <a:endParaRPr lang="ru-RU" dirty="0"/>
+          </a:p>
+        </p:txBody>
+      </p:sp>
+      <p:sp>
+        <p:nvSpPr>
+          <p:cNvPr id="4" name="Номер слайда 3"/>
+          <p:cNvSpPr>
+            <a:spLocks noGrp="1"/>
+          </p:cNvSpPr>
+          <p:nvPr>
+            <p:ph type="sldNum" sz="quarter" idx="10"/>
+          </p:nvPr>
+        </p:nvSpPr>
+        <p:spPr/>
+        <p:txBody>
+          <a:bodyPr/>
+          <a:lstStyle/>
+          <a:p>
+            <a:pPr>
+              <a:defRPr/>
+            </a:pPr>
+            <a:fld id="{5DDD994F-3BAF-42D9-A83D-4EE4A2B12B5A}" type="slidenum">
+              <a:rPr lang="ru-RU" smtClean="0"/>
+              <a:pPr>
+                <a:defRPr/>
+              </a:pPr>
+              <a:t>7</a:t>
+            </a:fld>
+            <a:endParaRPr lang="ru-RU"/>
+          </a:p>
+        </p:txBody>
+      </p:sp>
+    </p:spTree>
+    <p:extLst>
+      <p:ext uri="{BB962C8B-B14F-4D97-AF65-F5344CB8AC3E}">
+        <p14:creationId xmlns:p14="http://schemas.microsoft.com/office/powerpoint/2010/main" val="1371937275"/>
+      </p:ext>
+    </p:extLst>
+  </p:cSld>
+  <p:clrMapOvr>
+    <a:masterClrMapping/>
+  </p:clrMapOvr>
+</p:notes>
+</file>
+
+<file path=ppt/notesSlides/notesSlide7.xml><?xml version="1.0" encoding="utf-8"?>
+<p:notes xmlns:a="http://schemas.openxmlformats.org/drawingml/2006/main" xmlns:r="http://schemas.openxmlformats.org/officeDocument/2006/relationships" xmlns:p="http://schemas.openxmlformats.org/presentationml/2006/main">
+  <p:cSld>
+    <p:spTree>
+      <p:nvGrpSpPr>
+        <p:cNvPr id="1" name=""/>
+        <p:cNvGrpSpPr/>
+        <p:nvPr/>
+      </p:nvGrpSpPr>
+      <p:grpSpPr>
+        <a:xfrm>
+          <a:off x="0" y="0"/>
+          <a:ext cx="0" cy="0"/>
+          <a:chOff x="0" y="0"/>
+          <a:chExt cx="0" cy="0"/>
+        </a:xfrm>
+      </p:grpSpPr>
+      <p:sp>
+        <p:nvSpPr>
+          <p:cNvPr id="2" name="Образ слайда 1"/>
+          <p:cNvSpPr>
+            <a:spLocks noGrp="1" noRot="1" noChangeAspect="1"/>
+          </p:cNvSpPr>
+          <p:nvPr>
+            <p:ph type="sldImg"/>
+          </p:nvPr>
+        </p:nvSpPr>
+        <p:spPr/>
+      </p:sp>
+      <p:sp>
+        <p:nvSpPr>
+          <p:cNvPr id="3" name="Заметки 2"/>
+          <p:cNvSpPr>
+            <a:spLocks noGrp="1"/>
+          </p:cNvSpPr>
+          <p:nvPr>
+            <p:ph type="body" idx="1"/>
+          </p:nvPr>
+        </p:nvSpPr>
+        <p:spPr/>
+        <p:txBody>
+          <a:bodyPr/>
+          <a:lstStyle/>
+          <a:p>
+            <a:r>
+              <a:rPr lang="ru-RU" dirty="0" smtClean="0"/>
+              <a:t>В данном случае роль эвристической функции играют эталонные маршруты, заранее построенные по алгоритму </a:t>
+            </a:r>
+            <a:r>
+              <a:rPr lang="ru-RU" dirty="0" err="1" smtClean="0"/>
+              <a:t>Флойда</a:t>
+            </a:r>
+            <a:r>
+              <a:rPr lang="ru-RU" dirty="0" smtClean="0"/>
+              <a:t>. Алгоритм </a:t>
+            </a:r>
+            <a:r>
+              <a:rPr lang="ru-RU" dirty="0" err="1" smtClean="0"/>
+              <a:t>Флойда</a:t>
+            </a:r>
+            <a:r>
+              <a:rPr lang="ru-RU" dirty="0" smtClean="0"/>
+              <a:t> находит наилучший маршрут между каждой парой точек.</a:t>
+            </a:r>
+          </a:p>
+          <a:p>
+            <a:endParaRPr lang="ru-RU" dirty="0" smtClean="0"/>
+          </a:p>
+          <a:p>
+            <a:r>
+              <a:rPr lang="ru-RU" dirty="0" smtClean="0"/>
+              <a:t>Стоимость узла в разработанном алгоритме складывается из пройденного времени и предполагаемого времени до цели. Стоимость узла, основанная на времени, а не на расстоянии позволяет находить более оптимальные маршруты, где иногда быстрее подождать и пропустить проезжающую машину, чем объезжать ее.</a:t>
+            </a:r>
+            <a:endParaRPr lang="ru-RU" dirty="0"/>
+          </a:p>
+        </p:txBody>
+      </p:sp>
+      <p:sp>
+        <p:nvSpPr>
+          <p:cNvPr id="4" name="Номер слайда 3"/>
+          <p:cNvSpPr>
+            <a:spLocks noGrp="1"/>
+          </p:cNvSpPr>
+          <p:nvPr>
+            <p:ph type="sldNum" sz="quarter" idx="10"/>
+          </p:nvPr>
+        </p:nvSpPr>
+        <p:spPr/>
+        <p:txBody>
+          <a:bodyPr/>
+          <a:lstStyle/>
+          <a:p>
+            <a:pPr>
+              <a:defRPr/>
+            </a:pPr>
+            <a:fld id="{5DDD994F-3BAF-42D9-A83D-4EE4A2B12B5A}" type="slidenum">
+              <a:rPr lang="ru-RU" smtClean="0"/>
+              <a:pPr>
+                <a:defRPr/>
+              </a:pPr>
+              <a:t>8</a:t>
+            </a:fld>
+            <a:endParaRPr lang="ru-RU"/>
+          </a:p>
+        </p:txBody>
+      </p:sp>
+    </p:spTree>
+    <p:extLst>
+      <p:ext uri="{BB962C8B-B14F-4D97-AF65-F5344CB8AC3E}">
+        <p14:creationId xmlns:p14="http://schemas.microsoft.com/office/powerpoint/2010/main" val="3273918891"/>
+      </p:ext>
+    </p:extLst>
+  </p:cSld>
+  <p:clrMapOvr>
+    <a:masterClrMapping/>
+  </p:clrMapOvr>
+</p:notes>
+</file>
+
+<file path=ppt/notesSlides/notesSlide8.xml><?xml version="1.0" encoding="utf-8"?>
+<p:notes xmlns:a="http://schemas.openxmlformats.org/drawingml/2006/main" xmlns:r="http://schemas.openxmlformats.org/officeDocument/2006/relationships" xmlns:p="http://schemas.openxmlformats.org/presentationml/2006/main">
+  <p:cSld>
+    <p:spTree>
+      <p:nvGrpSpPr>
+        <p:cNvPr id="1" name=""/>
+        <p:cNvGrpSpPr/>
+        <p:nvPr/>
+      </p:nvGrpSpPr>
+      <p:grpSpPr>
+        <a:xfrm>
+          <a:off x="0" y="0"/>
+          <a:ext cx="0" cy="0"/>
+          <a:chOff x="0" y="0"/>
+          <a:chExt cx="0" cy="0"/>
+        </a:xfrm>
+      </p:grpSpPr>
+      <p:sp>
+        <p:nvSpPr>
+          <p:cNvPr id="2" name="Образ слайда 1"/>
+          <p:cNvSpPr>
+            <a:spLocks noGrp="1" noRot="1" noChangeAspect="1"/>
+          </p:cNvSpPr>
+          <p:nvPr>
+            <p:ph type="sldImg"/>
+          </p:nvPr>
+        </p:nvSpPr>
+        <p:spPr/>
+      </p:sp>
+      <p:sp>
+        <p:nvSpPr>
+          <p:cNvPr id="3" name="Заметки 2"/>
+          <p:cNvSpPr>
+            <a:spLocks noGrp="1"/>
+          </p:cNvSpPr>
+          <p:nvPr>
+            <p:ph type="body" idx="1"/>
+          </p:nvPr>
+        </p:nvSpPr>
+        <p:spPr/>
+        <p:txBody>
+          <a:bodyPr>
+            <a:normAutofit lnSpcReduction="10000"/>
+          </a:bodyPr>
+          <a:lstStyle/>
+          <a:p>
+            <a:r>
+              <a:rPr lang="ru-RU" dirty="0" smtClean="0"/>
+              <a:t>Разработанный алгоритм позволяет находить самый быстрый путь до цели, объехав все виды препятствий.</a:t>
+            </a:r>
+          </a:p>
+          <a:p>
+            <a:endParaRPr lang="ru-RU" dirty="0" smtClean="0"/>
+          </a:p>
+          <a:p>
+            <a:r>
+              <a:rPr lang="ru-RU" dirty="0" smtClean="0"/>
+              <a:t>был проведен эксперимент в котором</a:t>
+            </a:r>
+          </a:p>
+          <a:p>
+            <a:r>
+              <a:rPr lang="ru-RU" dirty="0" smtClean="0"/>
+              <a:t>	машины добавляются в случайное время, в случайном месте</a:t>
+            </a:r>
+          </a:p>
+          <a:p>
+            <a:r>
+              <a:rPr lang="ru-RU" dirty="0" smtClean="0"/>
+              <a:t>	но при этом у каждой заранее заданы точки прибытия на стоянку</a:t>
+            </a:r>
+          </a:p>
+          <a:p>
+            <a:endParaRPr lang="ru-RU" dirty="0" smtClean="0"/>
+          </a:p>
+          <a:p>
+            <a:endParaRPr lang="ru-RU" dirty="0" smtClean="0"/>
+          </a:p>
+          <a:p>
+            <a:r>
+              <a:rPr lang="ru-RU" dirty="0" smtClean="0"/>
+              <a:t>на видео </a:t>
+            </a:r>
+            <a:r>
+              <a:rPr lang="ru-RU" dirty="0" err="1" smtClean="0"/>
+              <a:t>видео</a:t>
+            </a:r>
+            <a:r>
+              <a:rPr lang="ru-RU" dirty="0" smtClean="0"/>
+              <a:t> видно</a:t>
+            </a:r>
+          </a:p>
+          <a:p>
+            <a:r>
+              <a:rPr lang="ru-RU" dirty="0" smtClean="0"/>
+              <a:t>Что машины не врезаются друг в друга и успешно объезжают стационарное препятствие.</a:t>
+            </a:r>
+          </a:p>
+          <a:p>
+            <a:endParaRPr lang="ru-RU" dirty="0" smtClean="0"/>
+          </a:p>
+          <a:p>
+            <a:endParaRPr lang="ru-RU" dirty="0" smtClean="0"/>
+          </a:p>
+          <a:p>
+            <a:r>
+              <a:rPr lang="ru-RU" dirty="0" smtClean="0"/>
+              <a:t>машины могут проезжать по ранее занятому месту.</a:t>
+            </a:r>
+          </a:p>
+          <a:p>
+            <a:r>
+              <a:rPr lang="ru-RU" dirty="0" smtClean="0"/>
+              <a:t>машинам не нужны светофоры для координации. Соответственно и тратить время, стоя на светофорах, не надо.</a:t>
+            </a:r>
+          </a:p>
+          <a:p>
+            <a:r>
+              <a:rPr lang="ru-RU" dirty="0" smtClean="0"/>
+              <a:t>так же видно, что машины могут заранее остановиться и пропустить проезжающие мимо машины, если ожидание занимает меньше времени, чем объехать рядом идущие машины.</a:t>
+            </a:r>
+            <a:endParaRPr lang="ru-RU" dirty="0"/>
+          </a:p>
+        </p:txBody>
+      </p:sp>
+      <p:sp>
+        <p:nvSpPr>
+          <p:cNvPr id="4" name="Номер слайда 3"/>
+          <p:cNvSpPr>
+            <a:spLocks noGrp="1"/>
+          </p:cNvSpPr>
+          <p:nvPr>
+            <p:ph type="sldNum" sz="quarter" idx="10"/>
+          </p:nvPr>
+        </p:nvSpPr>
+        <p:spPr/>
+        <p:txBody>
+          <a:bodyPr/>
+          <a:lstStyle/>
+          <a:p>
+            <a:pPr>
+              <a:defRPr/>
+            </a:pPr>
+            <a:fld id="{5DDD994F-3BAF-42D9-A83D-4EE4A2B12B5A}" type="slidenum">
+              <a:rPr lang="ru-RU" smtClean="0"/>
+              <a:pPr>
+                <a:defRPr/>
+              </a:pPr>
+              <a:t>9</a:t>
+            </a:fld>
+            <a:endParaRPr lang="ru-RU"/>
+          </a:p>
+        </p:txBody>
+      </p:sp>
+    </p:spTree>
+    <p:extLst>
+      <p:ext uri="{BB962C8B-B14F-4D97-AF65-F5344CB8AC3E}">
+        <p14:creationId xmlns:p14="http://schemas.microsoft.com/office/powerpoint/2010/main" val="1567468265"/>
+      </p:ext>
+    </p:extLst>
+  </p:cSld>
+  <p:clrMapOvr>
+    <a:masterClrMapping/>
+  </p:clrMapOvr>
+</p:notes>
+</file>
+
+<file path=ppt/notesSlides/notesSlide9.xml><?xml version="1.0" encoding="utf-8"?>
+<p:notes xmlns:a="http://schemas.openxmlformats.org/drawingml/2006/main" xmlns:r="http://schemas.openxmlformats.org/officeDocument/2006/relationships" xmlns:p="http://schemas.openxmlformats.org/presentationml/2006/main">
+  <p:cSld>
+    <p:spTree>
+      <p:nvGrpSpPr>
+        <p:cNvPr id="1" name=""/>
+        <p:cNvGrpSpPr/>
+        <p:nvPr/>
+      </p:nvGrpSpPr>
+      <p:grpSpPr>
+        <a:xfrm>
+          <a:off x="0" y="0"/>
+          <a:ext cx="0" cy="0"/>
+          <a:chOff x="0" y="0"/>
+          <a:chExt cx="0" cy="0"/>
+        </a:xfrm>
+      </p:grpSpPr>
+      <p:sp>
+        <p:nvSpPr>
+          <p:cNvPr id="2" name="Образ слайда 1"/>
+          <p:cNvSpPr>
+            <a:spLocks noGrp="1" noRot="1" noChangeAspect="1"/>
+          </p:cNvSpPr>
+          <p:nvPr>
+            <p:ph type="sldImg"/>
+          </p:nvPr>
+        </p:nvSpPr>
+        <p:spPr/>
+      </p:sp>
+      <p:sp>
+        <p:nvSpPr>
+          <p:cNvPr id="3" name="Заметки 2"/>
+          <p:cNvSpPr>
+            <a:spLocks noGrp="1"/>
+          </p:cNvSpPr>
+          <p:nvPr>
+            <p:ph type="body" idx="1"/>
+          </p:nvPr>
+        </p:nvSpPr>
+        <p:spPr/>
+        <p:txBody>
+          <a:bodyPr/>
+          <a:lstStyle/>
+          <a:p>
+            <a:endParaRPr lang="ru-RU" dirty="0"/>
+          </a:p>
+        </p:txBody>
+      </p:sp>
+      <p:sp>
+        <p:nvSpPr>
+          <p:cNvPr id="4" name="Номер слайда 3"/>
+          <p:cNvSpPr>
+            <a:spLocks noGrp="1"/>
+          </p:cNvSpPr>
+          <p:nvPr>
+            <p:ph type="sldNum" sz="quarter" idx="10"/>
+          </p:nvPr>
+        </p:nvSpPr>
+        <p:spPr/>
+        <p:txBody>
+          <a:bodyPr/>
+          <a:lstStyle/>
+          <a:p>
+            <a:pPr>
+              <a:defRPr/>
+            </a:pPr>
+            <a:fld id="{5DDD994F-3BAF-42D9-A83D-4EE4A2B12B5A}" type="slidenum">
+              <a:rPr lang="ru-RU" smtClean="0"/>
+              <a:pPr>
+                <a:defRPr/>
+              </a:pPr>
+              <a:t>11</a:t>
+            </a:fld>
+            <a:endParaRPr lang="ru-RU"/>
+          </a:p>
+        </p:txBody>
+      </p:sp>
+    </p:spTree>
+    <p:extLst>
+      <p:ext uri="{BB962C8B-B14F-4D97-AF65-F5344CB8AC3E}">
+        <p14:creationId xmlns:p14="http://schemas.microsoft.com/office/powerpoint/2010/main" val="3364070874"/>
+      </p:ext>
+    </p:extLst>
+  </p:cSld>
+  <p:clrMapOvr>
+    <a:masterClrMapping/>
+  </p:clrMapOvr>
+</p:notes>
+</file>
+
 <file path=ppt/slideLayouts/slideLayout1.xml><?xml version="1.0" encoding="utf-8"?>
 <p:sldLayout xmlns:a="http://schemas.openxmlformats.org/drawingml/2006/main" xmlns:r="http://schemas.openxmlformats.org/officeDocument/2006/relationships" xmlns:p="http://schemas.openxmlformats.org/presentationml/2006/main" type="title" preserve="1">
   <p:cSld name="Титульный слайд">
@@ -791,7 +1786,7 @@
               <a:pPr>
                 <a:defRPr/>
               </a:pPr>
-              <a:t>19.05.2020</a:t>
+              <a:t>18.06.2020</a:t>
             </a:fld>
             <a:endParaRPr lang="ru-RU"/>
           </a:p>
@@ -981,7 +1976,7 @@
               <a:pPr>
                 <a:defRPr/>
               </a:pPr>
-              <a:t>19.05.2020</a:t>
+              <a:t>18.06.2020</a:t>
             </a:fld>
             <a:endParaRPr lang="ru-RU"/>
           </a:p>
@@ -1181,7 +2176,7 @@
               <a:pPr>
                 <a:defRPr/>
               </a:pPr>
-              <a:t>19.05.2020</a:t>
+              <a:t>18.06.2020</a:t>
             </a:fld>
             <a:endParaRPr lang="ru-RU"/>
           </a:p>
@@ -1392,7 +2387,7 @@
               <a:pPr>
                 <a:defRPr/>
               </a:pPr>
-              <a:t>19.05.2020</a:t>
+              <a:t>18.06.2020</a:t>
             </a:fld>
             <a:endParaRPr lang="ru-RU"/>
           </a:p>
@@ -1661,7 +2656,7 @@
               <a:pPr>
                 <a:defRPr/>
               </a:pPr>
-              <a:t>19.05.2020</a:t>
+              <a:t>18.06.2020</a:t>
             </a:fld>
             <a:endParaRPr lang="ru-RU"/>
           </a:p>
@@ -1973,7 +2968,7 @@
               <a:pPr>
                 <a:defRPr/>
               </a:pPr>
-              <a:t>19.05.2020</a:t>
+              <a:t>18.06.2020</a:t>
             </a:fld>
             <a:endParaRPr lang="ru-RU"/>
           </a:p>
@@ -2419,7 +3414,7 @@
               <a:pPr>
                 <a:defRPr/>
               </a:pPr>
-              <a:t>19.05.2020</a:t>
+              <a:t>18.06.2020</a:t>
             </a:fld>
             <a:endParaRPr lang="ru-RU"/>
           </a:p>
@@ -2563,7 +3558,7 @@
               <a:pPr>
                 <a:defRPr/>
               </a:pPr>
-              <a:t>19.05.2020</a:t>
+              <a:t>18.06.2020</a:t>
             </a:fld>
             <a:endParaRPr lang="ru-RU"/>
           </a:p>
@@ -2680,7 +3675,7 @@
               <a:pPr>
                 <a:defRPr/>
               </a:pPr>
-              <a:t>19.05.2020</a:t>
+              <a:t>18.06.2020</a:t>
             </a:fld>
             <a:endParaRPr lang="ru-RU"/>
           </a:p>
@@ -2977,7 +3972,7 @@
               <a:pPr>
                 <a:defRPr/>
               </a:pPr>
-              <a:t>19.05.2020</a:t>
+              <a:t>18.06.2020</a:t>
             </a:fld>
             <a:endParaRPr lang="ru-RU"/>
           </a:p>
@@ -3254,7 +4249,7 @@
               <a:pPr>
                 <a:defRPr/>
               </a:pPr>
-              <a:t>19.05.2020</a:t>
+              <a:t>18.06.2020</a:t>
             </a:fld>
             <a:endParaRPr lang="ru-RU"/>
           </a:p>
@@ -3510,7 +4505,7 @@
               <a:pPr>
                 <a:defRPr/>
               </a:pPr>
-              <a:t>19.05.2020</a:t>
+              <a:t>18.06.2020</a:t>
             </a:fld>
             <a:endParaRPr lang="ru-RU"/>
           </a:p>
@@ -4599,65 +5594,37 @@
           <a:p>
             <a:r>
               <a:rPr lang="ru-RU" dirty="0"/>
-              <a:t>ЗАКЛЮЧЕНИЕ</a:t>
-            </a:r>
-          </a:p>
-        </p:txBody>
-      </p:sp>
-      <p:sp>
-        <p:nvSpPr>
-          <p:cNvPr id="3" name="Содержимое 2"/>
-          <p:cNvSpPr>
-            <a:spLocks noGrp="1"/>
-          </p:cNvSpPr>
+              <a:t>ОПИСАНИЕ РАЗРАБОТКИ</a:t>
+            </a:r>
+          </a:p>
+        </p:txBody>
+      </p:sp>
+      <p:pic>
+        <p:nvPicPr>
+          <p:cNvPr id="6" name="Объект 5"/>
+          <p:cNvPicPr>
+            <a:picLocks noGrp="1" noChangeAspect="1"/>
+          </p:cNvPicPr>
           <p:nvPr>
             <p:ph idx="1"/>
           </p:nvPr>
-        </p:nvSpPr>
+        </p:nvPicPr>
+        <p:blipFill>
+          <a:blip r:embed="rId2"/>
+          <a:stretch>
+            <a:fillRect/>
+          </a:stretch>
+        </p:blipFill>
         <p:spPr>
           <a:xfrm>
-            <a:off x="457200" y="1412776"/>
-            <a:ext cx="8229600" cy="4713387"/>
+            <a:off x="490251" y="2492896"/>
+            <a:ext cx="8229600" cy="3583222"/>
           </a:xfrm>
+          <a:prstGeom prst="rect">
+            <a:avLst/>
+          </a:prstGeom>
         </p:spPr>
-        <p:txBody>
-          <a:bodyPr/>
-          <a:lstStyle/>
-          <a:p>
-            <a:r>
-              <a:rPr lang="ru-RU" dirty="0"/>
-              <a:t>Была создана </a:t>
-            </a:r>
-            <a:r>
-              <a:rPr lang="ru-RU" dirty="0" smtClean="0"/>
-              <a:t>симуляция на </a:t>
-            </a:r>
-            <a:r>
-              <a:rPr lang="en-US" smtClean="0"/>
-              <a:t>JavaFX</a:t>
-            </a:r>
-            <a:r>
-              <a:rPr lang="ru-RU" smtClean="0"/>
-              <a:t> </a:t>
-            </a:r>
-            <a:r>
-              <a:rPr lang="ru-RU" dirty="0"/>
-              <a:t>(непроходимые препятствия, столкновения машин и т.п</a:t>
-            </a:r>
-            <a:r>
-              <a:rPr lang="ru-RU" dirty="0" smtClean="0"/>
-              <a:t>.)</a:t>
-            </a:r>
-          </a:p>
-          <a:p>
-            <a:r>
-              <a:rPr lang="ru-RU" dirty="0" smtClean="0"/>
-              <a:t>Был создан алгоритм централизованной раздачи маршрутов для автопилотов.</a:t>
-            </a:r>
-            <a:endParaRPr lang="ru-RU" dirty="0"/>
-          </a:p>
-        </p:txBody>
-      </p:sp>
+      </p:pic>
       <p:sp>
         <p:nvSpPr>
           <p:cNvPr id="4" name="Номер слайда 3"/>
@@ -4684,6 +5651,52 @@
               <a:t>10</a:t>
             </a:fld>
             <a:endParaRPr lang="ru-RU" dirty="0"/>
+          </a:p>
+        </p:txBody>
+      </p:sp>
+      <p:sp>
+        <p:nvSpPr>
+          <p:cNvPr id="7" name="TextBox 6"/>
+          <p:cNvSpPr txBox="1"/>
+          <p:nvPr/>
+        </p:nvSpPr>
+        <p:spPr>
+          <a:xfrm>
+            <a:off x="1285852" y="1553446"/>
+            <a:ext cx="6211380" cy="553998"/>
+          </a:xfrm>
+          <a:prstGeom prst="rect">
+            <a:avLst/>
+          </a:prstGeom>
+          <a:noFill/>
+        </p:spPr>
+        <p:txBody>
+          <a:bodyPr wrap="none" rtlCol="0">
+            <a:spAutoFit/>
+          </a:bodyPr>
+          <a:lstStyle/>
+          <a:p>
+            <a:r>
+              <a:rPr lang="ru-RU" sz="3000" dirty="0" smtClean="0">
+                <a:latin typeface="+mj-lt"/>
+              </a:rPr>
+              <a:t>Главное из </a:t>
+            </a:r>
+            <a:r>
+              <a:rPr lang="en-US" sz="3000" dirty="0" smtClean="0">
+                <a:latin typeface="+mj-lt"/>
+              </a:rPr>
+              <a:t>UML </a:t>
+            </a:r>
+            <a:r>
+              <a:rPr lang="ru-RU" sz="3000" dirty="0" smtClean="0">
+                <a:latin typeface="+mj-lt"/>
+              </a:rPr>
+              <a:t>диаграммы проекта</a:t>
+            </a:r>
+            <a:endParaRPr lang="ru-RU" sz="3000" dirty="0">
+              <a:latin typeface="+mj-lt"/>
+            </a:endParaRPr>
           </a:p>
         </p:txBody>
       </p:sp>
@@ -4726,6 +5739,147 @@
             <a:spLocks noGrp="1"/>
           </p:cNvSpPr>
           <p:nvPr>
+            <p:ph type="title"/>
+          </p:nvPr>
+        </p:nvSpPr>
+        <p:spPr/>
+        <p:txBody>
+          <a:bodyPr/>
+          <a:lstStyle/>
+          <a:p>
+            <a:r>
+              <a:rPr lang="ru-RU" dirty="0"/>
+              <a:t>ЗАКЛЮЧЕНИЕ</a:t>
+            </a:r>
+          </a:p>
+        </p:txBody>
+      </p:sp>
+      <p:sp>
+        <p:nvSpPr>
+          <p:cNvPr id="3" name="Содержимое 2"/>
+          <p:cNvSpPr>
+            <a:spLocks noGrp="1"/>
+          </p:cNvSpPr>
+          <p:nvPr>
+            <p:ph idx="1"/>
+          </p:nvPr>
+        </p:nvSpPr>
+        <p:spPr>
+          <a:xfrm>
+            <a:off x="457200" y="1412776"/>
+            <a:ext cx="8229600" cy="4713387"/>
+          </a:xfrm>
+        </p:spPr>
+        <p:txBody>
+          <a:bodyPr/>
+          <a:lstStyle/>
+          <a:p>
+            <a:r>
+              <a:rPr lang="ru-RU" dirty="0"/>
+              <a:t>Была создана </a:t>
+            </a:r>
+            <a:r>
+              <a:rPr lang="ru-RU" dirty="0" smtClean="0"/>
+              <a:t>симуляция движения машин </a:t>
+            </a:r>
+            <a:r>
+              <a:rPr lang="ru-RU" dirty="0" smtClean="0"/>
+              <a:t>на </a:t>
+            </a:r>
+            <a:r>
+              <a:rPr lang="en-US" dirty="0" smtClean="0"/>
+              <a:t>JavaFX</a:t>
+            </a:r>
+            <a:r>
+              <a:rPr lang="ru-RU" dirty="0" smtClean="0"/>
+              <a:t> </a:t>
+            </a:r>
+            <a:r>
+              <a:rPr lang="ru-RU" dirty="0"/>
+              <a:t>(непроходимые препятствия, столкновения машин и т.п</a:t>
+            </a:r>
+            <a:r>
+              <a:rPr lang="ru-RU" dirty="0" smtClean="0"/>
+              <a:t>.)</a:t>
+            </a:r>
+          </a:p>
+          <a:p>
+            <a:r>
+              <a:rPr lang="ru-RU" dirty="0" smtClean="0"/>
+              <a:t>Был создан алгоритм централизованной раздачи маршрутов для автопилотов.</a:t>
+            </a:r>
+            <a:endParaRPr lang="ru-RU" dirty="0"/>
+          </a:p>
+        </p:txBody>
+      </p:sp>
+      <p:sp>
+        <p:nvSpPr>
+          <p:cNvPr id="4" name="Номер слайда 3"/>
+          <p:cNvSpPr>
+            <a:spLocks noGrp="1"/>
+          </p:cNvSpPr>
+          <p:nvPr>
+            <p:ph type="sldNum" sz="quarter" idx="12"/>
+          </p:nvPr>
+        </p:nvSpPr>
+        <p:spPr/>
+        <p:txBody>
+          <a:bodyPr/>
+          <a:lstStyle/>
+          <a:p>
+            <a:pPr>
+              <a:defRPr/>
+            </a:pPr>
+            <a:fld id="{BB3B5E7F-AE2F-46EF-84F8-F046D8633343}" type="slidenum">
+              <a:rPr lang="ru-RU" smtClean="0"/>
+              <a:pPr>
+                <a:defRPr/>
+              </a:pPr>
+              <a:t>11</a:t>
+            </a:fld>
+            <a:endParaRPr lang="ru-RU" dirty="0"/>
+          </a:p>
+        </p:txBody>
+      </p:sp>
+    </p:spTree>
+  </p:cSld>
+  <p:clrMapOvr>
+    <a:masterClrMapping/>
+  </p:clrMapOvr>
+  <p:timing>
+    <p:tnLst>
+      <p:par>
+        <p:cTn id="1" dur="indefinite" restart="never" nodeType="tmRoot"/>
+      </p:par>
+    </p:tnLst>
+  </p:timing>
+</p:sld>
+</file>
+
+<file path=ppt/slides/slide12.xml><?xml version="1.0" encoding="utf-8"?>
+<p:sld xmlns:a="http://schemas.openxmlformats.org/drawingml/2006/main" xmlns:r="http://schemas.openxmlformats.org/officeDocument/2006/relationships" xmlns:p="http://schemas.openxmlformats.org/presentationml/2006/main">
+  <p:cSld>
+    <p:spTree>
+      <p:nvGrpSpPr>
+        <p:cNvPr id="1" name=""/>
+        <p:cNvGrpSpPr/>
+        <p:nvPr/>
+      </p:nvGrpSpPr>
+      <p:grpSpPr>
+        <a:xfrm>
+          <a:off x="0" y="0"/>
+          <a:ext cx="0" cy="0"/>
+          <a:chOff x="0" y="0"/>
+          <a:chExt cx="0" cy="0"/>
+        </a:xfrm>
+      </p:grpSpPr>
+      <p:sp>
+        <p:nvSpPr>
+          <p:cNvPr id="2" name="Заголовок 1"/>
+          <p:cNvSpPr>
+            <a:spLocks noGrp="1"/>
+          </p:cNvSpPr>
+          <p:nvPr>
             <p:ph type="ctrTitle"/>
           </p:nvPr>
         </p:nvSpPr>
@@ -4811,7 +5965,7 @@
           </p:nvPr>
         </p:nvPicPr>
         <p:blipFill>
-          <a:blip r:embed="rId2" cstate="print">
+          <a:blip r:embed="rId3" cstate="print">
             <a:extLst>
               <a:ext uri="{28A0092B-C50C-407E-A947-70E740481C1C}">
                 <a14:useLocalDpi xmlns:a14="http://schemas.microsoft.com/office/drawing/2010/main" val="0"/>
@@ -4977,7 +6131,7 @@
                 <a:ea typeface="TimesNewRomanPSMT"/>
                 <a:cs typeface="Times New Roman" panose="02020603050405020304" pitchFamily="18" charset="0"/>
               </a:rPr>
-              <a:t>Разработать централизованный логистический алгоритм (в дальнейшем называемый ЦКА (Центральный Контроль Автопилотов</a:t>
+              <a:t>Разработать централизованный логистический </a:t>
             </a:r>
             <a:r>
               <a:rPr lang="ru-RU" sz="2500" dirty="0" smtClean="0">
@@ -4988,31 +6142,7 @@
                 <a:ea typeface="TimesNewRomanPSMT"/>
                 <a:cs typeface="Times New Roman" panose="02020603050405020304" pitchFamily="18" charset="0"/>
               </a:rPr>
-              <a:t>)).</a:t>
-            </a:r>
-            <a:endParaRPr lang="ru-RU" sz="2500" dirty="0" smtClean="0">
-              <a:latin typeface="+mj-lt"/>
-              <a:ea typeface="TimesNewRomanPSMT"/>
-              <a:cs typeface="Times New Roman" panose="02020603050405020304" pitchFamily="18" charset="0"/>
-            </a:endParaRPr>
-          </a:p>
-          <a:p>
-            <a:pPr marL="0" lvl="0" indent="0" algn="just">
-              <a:spcAft>
-                <a:spcPts val="0"/>
-              </a:spcAft>
-              <a:buNone/>
-            </a:pPr>
-            <a:r>
-              <a:rPr lang="ru-RU" sz="2500" dirty="0" smtClean="0">
-                <a:solidFill>
-                  <a:srgbClr val="181A17"/>
-                </a:solidFill>
-                <a:latin typeface="+mj-lt"/>
-                <a:ea typeface="TimesNewRomanPSMT"/>
-                <a:cs typeface="Times New Roman" panose="02020603050405020304" pitchFamily="18" charset="0"/>
-              </a:rPr>
-              <a:t>      Задачи алгоритма:</a:t>
+              <a:t>алгоритм который:</a:t>
             </a:r>
             <a:endParaRPr lang="ru-RU" sz="2500" dirty="0" smtClean="0">
               <a:latin typeface="+mj-lt"/>
@@ -5036,7 +6166,18 @@
                 <a:ea typeface="TimesNewRomanPSMT"/>
                 <a:cs typeface="Times New Roman" panose="02020603050405020304" pitchFamily="18" charset="0"/>
               </a:rPr>
-              <a:t>	1) раздать </a:t>
+              <a:t>	1) </a:t>
+            </a:r>
+            <a:r>
+              <a:rPr lang="ru-RU" sz="2500" dirty="0" smtClean="0">
+                <a:solidFill>
+                  <a:srgbClr val="181A17"/>
+                </a:solidFill>
+                <a:latin typeface="+mj-lt"/>
+                <a:ea typeface="TimesNewRomanPSMT"/>
+                <a:cs typeface="Times New Roman" panose="02020603050405020304" pitchFamily="18" charset="0"/>
+              </a:rPr>
+              <a:t>раздает </a:t>
             </a:r>
             <a:r>
               <a:rPr lang="ru-RU" sz="2500" dirty="0">
@@ -5069,7 +6210,18 @@
                 <a:ea typeface="TimesNewRomanPSMT"/>
                 <a:cs typeface="Times New Roman" panose="02020603050405020304" pitchFamily="18" charset="0"/>
               </a:rPr>
-              <a:t>  //FIXME  </a:t>
+              <a:t>  </a:t>
+            </a:r>
+            <a:r>
+              <a:rPr lang="en-US" sz="2500" dirty="0" smtClean="0">
+                <a:solidFill>
+                  <a:srgbClr val="181A17"/>
+                </a:solidFill>
+                <a:latin typeface="+mj-lt"/>
+                <a:ea typeface="TimesNewRomanPSMT"/>
+                <a:cs typeface="Times New Roman" panose="02020603050405020304" pitchFamily="18" charset="0"/>
+              </a:rPr>
+              <a:t>  </a:t>
             </a:r>
             <a:r>
               <a:rPr lang="ru-RU" sz="2500" dirty="0" smtClean="0">
@@ -5115,7 +6267,18 @@
                 <a:ea typeface="TimesNewRomanPSMT"/>
                 <a:cs typeface="Times New Roman" panose="02020603050405020304" pitchFamily="18" charset="0"/>
               </a:rPr>
-              <a:t>	2)   организовать </a:t>
+              <a:t>	2)   </a:t>
+            </a:r>
+            <a:r>
+              <a:rPr lang="ru-RU" sz="2500" dirty="0" smtClean="0">
+                <a:solidFill>
+                  <a:srgbClr val="181A17"/>
+                </a:solidFill>
+                <a:latin typeface="+mj-lt"/>
+                <a:ea typeface="TimesNewRomanPSMT"/>
+                <a:cs typeface="Times New Roman" panose="02020603050405020304" pitchFamily="18" charset="0"/>
+              </a:rPr>
+              <a:t>организует </a:t>
             </a:r>
             <a:r>
               <a:rPr lang="ru-RU" sz="2500" dirty="0">
@@ -5463,7 +6626,7 @@
           <a:p>
             <a:r>
               <a:rPr lang="ru-RU" dirty="0"/>
-              <a:t>ПОСТАНОВКА ЗАДАЧИ</a:t>
+              <a:t>ОПИСАНИЕ РАЗРАБОТКИ</a:t>
             </a:r>
           </a:p>
         </p:txBody>
@@ -5499,269 +6662,273 @@
       </p:sp>
       <p:sp>
         <p:nvSpPr>
-          <p:cNvPr id="5" name="Прямоугольник 4"/>
-          <p:cNvSpPr/>
-          <p:nvPr/>
+          <p:cNvPr id="3" name="Объект 2"/>
+          <p:cNvSpPr>
+            <a:spLocks noGrp="1"/>
+          </p:cNvSpPr>
+          <p:nvPr>
+            <p:ph idx="1"/>
+          </p:nvPr>
         </p:nvSpPr>
         <p:spPr>
           <a:xfrm>
-            <a:off x="539552" y="1340768"/>
-            <a:ext cx="7992888" cy="3935501"/>
+            <a:off x="457200" y="1844824"/>
+            <a:ext cx="4330824" cy="4281339"/>
+          </a:xfrm>
+        </p:spPr>
+        <p:txBody>
+          <a:bodyPr/>
+          <a:lstStyle/>
+          <a:p>
+            <a:endParaRPr lang="ru-RU" dirty="0"/>
+          </a:p>
+        </p:txBody>
+      </p:sp>
+      <p:sp>
+        <p:nvSpPr>
+          <p:cNvPr id="8" name="TextBox 7"/>
+          <p:cNvSpPr txBox="1"/>
+          <p:nvPr/>
+        </p:nvSpPr>
+        <p:spPr>
+          <a:xfrm>
+            <a:off x="1285852" y="889842"/>
+            <a:ext cx="6382492" cy="1015663"/>
           </a:xfrm>
           <a:prstGeom prst="rect">
             <a:avLst/>
           </a:prstGeom>
+          <a:noFill/>
         </p:spPr>
         <p:txBody>
-          <a:bodyPr wrap="square">
+          <a:bodyPr wrap="square" rtlCol="0">
             <a:spAutoFit/>
           </a:bodyPr>
           <a:lstStyle/>
           <a:p>
-            <a:pPr algn="just">
-              <a:lnSpc>
-                <a:spcPct val="150000"/>
-              </a:lnSpc>
+            <a:r>
+              <a:rPr lang="ru-RU" sz="3000" dirty="0" smtClean="0">
+                <a:latin typeface="+mj-lt"/>
+              </a:rPr>
+              <a:t>Алгоритм централизованной раздачи маршрутов автопилотам</a:t>
+            </a:r>
+            <a:endParaRPr lang="ru-RU" sz="3000" dirty="0">
+              <a:latin typeface="+mj-lt"/>
+            </a:endParaRPr>
+          </a:p>
+        </p:txBody>
+      </p:sp>
+      <p:sp>
+        <p:nvSpPr>
+          <p:cNvPr id="6" name="Объект 2"/>
+          <p:cNvSpPr txBox="1">
+            <a:spLocks/>
+          </p:cNvSpPr>
+          <p:nvPr/>
+        </p:nvSpPr>
+        <p:spPr bwMode="auto">
+          <a:xfrm>
+            <a:off x="4788024" y="1628800"/>
+            <a:ext cx="4320480" cy="4281339"/>
+          </a:xfrm>
+          <a:prstGeom prst="rect">
+            <a:avLst/>
+          </a:prstGeom>
+          <a:noFill/>
+          <a:ln w="9525">
+            <a:noFill/>
+            <a:miter lim="800000"/>
+            <a:headEnd/>
+            <a:tailEnd/>
+          </a:ln>
+        </p:spPr>
+        <p:txBody>
+          <a:bodyPr vert="horz" wrap="square" lIns="91440" tIns="45720" rIns="91440" bIns="45720" numCol="1" anchor="t" anchorCtr="0" compatLnSpc="1">
+            <a:prstTxWarp prst="textNoShape">
+              <a:avLst/>
+            </a:prstTxWarp>
+          </a:bodyPr>
+          <a:lstStyle>
+            <a:lvl1pPr marL="342900" indent="-342900" algn="l" rtl="0" fontAlgn="base">
+              <a:spcBef>
+                <a:spcPct val="20000"/>
+              </a:spcBef>
               <a:spcAft>
-                <a:spcPts val="0"/>
+                <a:spcPct val="0"/>
               </a:spcAft>
-            </a:pPr>
-            <a:r>
-              <a:rPr lang="ru-RU" sz="1400" b="1" dirty="0">
-                <a:solidFill>
-                  <a:srgbClr val="181A17"/>
-                </a:solidFill>
-                <a:latin typeface="Arial" panose="020B0604020202020204" pitchFamily="34" charset="0"/>
-                <a:ea typeface="TimesNewRomanPSMT"/>
-                <a:cs typeface="Arial" panose="020B0604020202020204" pitchFamily="34" charset="0"/>
-              </a:rPr>
-              <a:t>Техническое задание для алгоритма</a:t>
-            </a:r>
-            <a:endParaRPr lang="ru-RU" sz="1400" b="1" dirty="0">
-              <a:solidFill>
-                <a:srgbClr val="181A17"/>
-              </a:solidFill>
-              <a:latin typeface="Arial" panose="020B0604020202020204" pitchFamily="34" charset="0"/>
-              <a:ea typeface="TimesNewRomanPSMT"/>
-              <a:cs typeface="Times New Roman" panose="02020603050405020304" pitchFamily="18" charset="0"/>
-            </a:endParaRPr>
-          </a:p>
-          <a:p>
-            <a:pPr lvl="0">
-              <a:lnSpc>
-                <a:spcPct val="150000"/>
-              </a:lnSpc>
+              <a:buFont typeface="Arial" charset="0"/>
+              <a:buChar char="•"/>
+              <a:defRPr sz="3000" kern="1200">
+                <a:solidFill>
+                  <a:schemeClr val="tx1"/>
+                </a:solidFill>
+                <a:latin typeface="+mn-lt"/>
+                <a:ea typeface="+mn-ea"/>
+                <a:cs typeface="+mn-cs"/>
+              </a:defRPr>
+            </a:lvl1pPr>
+            <a:lvl2pPr marL="742950" indent="-285750" algn="l" rtl="0" fontAlgn="base">
+              <a:spcBef>
+                <a:spcPct val="20000"/>
+              </a:spcBef>
               <a:spcAft>
-                <a:spcPts val="0"/>
+                <a:spcPct val="0"/>
               </a:spcAft>
-            </a:pPr>
-            <a:r>
-              <a:rPr lang="ru-RU" sz="1400" dirty="0" smtClean="0">
-                <a:latin typeface="Arial" panose="020B0604020202020204" pitchFamily="34" charset="0"/>
-                <a:ea typeface="TimesNewRomanPSMT"/>
-                <a:cs typeface="Times New Roman" panose="02020603050405020304" pitchFamily="18" charset="0"/>
-              </a:rPr>
-              <a:t>1. Пока </a:t>
-            </a:r>
-            <a:r>
-              <a:rPr lang="ru-RU" sz="1400" dirty="0">
-                <a:latin typeface="Arial" panose="020B0604020202020204" pitchFamily="34" charset="0"/>
-                <a:ea typeface="TimesNewRomanPSMT"/>
-                <a:cs typeface="Times New Roman" panose="02020603050405020304" pitchFamily="18" charset="0"/>
-              </a:rPr>
-              <a:t>есть возможность доехать до точки прибытия, ЦКА должен вести туда машины.</a:t>
-            </a:r>
-            <a:endParaRPr lang="ru-RU" sz="1400" dirty="0">
-              <a:latin typeface="Calibri" panose="020F0502020204030204" pitchFamily="34" charset="0"/>
-              <a:ea typeface="Calibri" panose="020F0502020204030204" pitchFamily="34" charset="0"/>
-              <a:cs typeface="Times New Roman" panose="02020603050405020304" pitchFamily="18" charset="0"/>
-            </a:endParaRPr>
-          </a:p>
-          <a:p>
-            <a:pPr lvl="0">
-              <a:lnSpc>
-                <a:spcPct val="150000"/>
-              </a:lnSpc>
+              <a:buFont typeface="Arial" charset="0"/>
+              <a:buChar char="–"/>
+              <a:defRPr sz="2600" kern="1200">
+                <a:solidFill>
+                  <a:schemeClr val="tx1"/>
+                </a:solidFill>
+                <a:latin typeface="+mn-lt"/>
+                <a:ea typeface="+mn-ea"/>
+                <a:cs typeface="+mn-cs"/>
+              </a:defRPr>
+            </a:lvl2pPr>
+            <a:lvl3pPr marL="1143000" indent="-228600" algn="l" rtl="0" fontAlgn="base">
+              <a:spcBef>
+                <a:spcPct val="20000"/>
+              </a:spcBef>
               <a:spcAft>
-                <a:spcPts val="0"/>
+                <a:spcPct val="0"/>
               </a:spcAft>
-            </a:pPr>
-            <a:r>
-              <a:rPr lang="ru-RU" sz="1400" dirty="0" smtClean="0">
-                <a:latin typeface="Arial" panose="020B0604020202020204" pitchFamily="34" charset="0"/>
-                <a:ea typeface="TimesNewRomanPSMT"/>
-                <a:cs typeface="Times New Roman" panose="02020603050405020304" pitchFamily="18" charset="0"/>
-              </a:rPr>
-              <a:t>2. ЦКА </a:t>
-            </a:r>
-            <a:r>
-              <a:rPr lang="ru-RU" sz="1400" dirty="0">
-                <a:latin typeface="Arial" panose="020B0604020202020204" pitchFamily="34" charset="0"/>
-                <a:ea typeface="TimesNewRomanPSMT"/>
-                <a:cs typeface="Times New Roman" panose="02020603050405020304" pitchFamily="18" charset="0"/>
-              </a:rPr>
-              <a:t>должен успешно преодолевать</a:t>
-            </a:r>
-            <a:endParaRPr lang="ru-RU" sz="1400" dirty="0">
-              <a:latin typeface="Calibri" panose="020F0502020204030204" pitchFamily="34" charset="0"/>
-              <a:ea typeface="Calibri" panose="020F0502020204030204" pitchFamily="34" charset="0"/>
-              <a:cs typeface="Times New Roman" panose="02020603050405020304" pitchFamily="18" charset="0"/>
-            </a:endParaRPr>
-          </a:p>
-          <a:p>
-            <a:pPr lvl="1">
-              <a:lnSpc>
-                <a:spcPct val="150000"/>
-              </a:lnSpc>
+              <a:buFont typeface="Arial" charset="0"/>
+              <a:buChar char="•"/>
+              <a:defRPr sz="2400" kern="1200">
+                <a:solidFill>
+                  <a:schemeClr val="tx1"/>
+                </a:solidFill>
+                <a:latin typeface="+mn-lt"/>
+                <a:ea typeface="+mn-ea"/>
+                <a:cs typeface="+mn-cs"/>
+              </a:defRPr>
+            </a:lvl3pPr>
+            <a:lvl4pPr marL="1600200" indent="-228600" algn="l" rtl="0" fontAlgn="base">
+              <a:spcBef>
+                <a:spcPct val="20000"/>
+              </a:spcBef>
               <a:spcAft>
-                <a:spcPts val="0"/>
+                <a:spcPct val="0"/>
               </a:spcAft>
-            </a:pPr>
-            <a:r>
-              <a:rPr lang="ru-RU" sz="1400" dirty="0" smtClean="0">
-                <a:latin typeface="Arial" panose="020B0604020202020204" pitchFamily="34" charset="0"/>
-                <a:ea typeface="TimesNewRomanPSMT"/>
-                <a:cs typeface="Times New Roman" panose="02020603050405020304" pitchFamily="18" charset="0"/>
-              </a:rPr>
-              <a:t>1) Статичные </a:t>
-            </a:r>
-            <a:r>
-              <a:rPr lang="ru-RU" sz="1400" dirty="0">
-                <a:latin typeface="Arial" panose="020B0604020202020204" pitchFamily="34" charset="0"/>
-                <a:ea typeface="TimesNewRomanPSMT"/>
-                <a:cs typeface="Times New Roman" panose="02020603050405020304" pitchFamily="18" charset="0"/>
-              </a:rPr>
-              <a:t>препятствия (здания т.п.)</a:t>
-            </a:r>
-            <a:endParaRPr lang="ru-RU" sz="1400" dirty="0">
-              <a:latin typeface="Calibri" panose="020F0502020204030204" pitchFamily="34" charset="0"/>
-              <a:ea typeface="Calibri" panose="020F0502020204030204" pitchFamily="34" charset="0"/>
-              <a:cs typeface="Times New Roman" panose="02020603050405020304" pitchFamily="18" charset="0"/>
-            </a:endParaRPr>
-          </a:p>
-          <a:p>
-            <a:pPr lvl="1">
-              <a:lnSpc>
-                <a:spcPct val="150000"/>
-              </a:lnSpc>
+              <a:buFont typeface="Arial" charset="0"/>
+              <a:buChar char="–"/>
+              <a:defRPr sz="2000" kern="1200">
+                <a:solidFill>
+                  <a:schemeClr val="tx1"/>
+                </a:solidFill>
+                <a:latin typeface="+mn-lt"/>
+                <a:ea typeface="+mn-ea"/>
+                <a:cs typeface="+mn-cs"/>
+              </a:defRPr>
+            </a:lvl4pPr>
+            <a:lvl5pPr marL="2057400" indent="-228600" algn="l" rtl="0" fontAlgn="base">
+              <a:spcBef>
+                <a:spcPct val="20000"/>
+              </a:spcBef>
               <a:spcAft>
-                <a:spcPts val="0"/>
+                <a:spcPct val="0"/>
               </a:spcAft>
-            </a:pPr>
-            <a:r>
-              <a:rPr lang="ru-RU" sz="1400" dirty="0" smtClean="0">
-                <a:latin typeface="Arial" panose="020B0604020202020204" pitchFamily="34" charset="0"/>
-                <a:ea typeface="TimesNewRomanPSMT"/>
-                <a:cs typeface="Times New Roman" panose="02020603050405020304" pitchFamily="18" charset="0"/>
-              </a:rPr>
-              <a:t>2) Динамические </a:t>
-            </a:r>
-            <a:r>
-              <a:rPr lang="ru-RU" sz="1400" dirty="0">
-                <a:latin typeface="Arial" panose="020B0604020202020204" pitchFamily="34" charset="0"/>
-                <a:ea typeface="TimesNewRomanPSMT"/>
-                <a:cs typeface="Times New Roman" panose="02020603050405020304" pitchFamily="18" charset="0"/>
-              </a:rPr>
-              <a:t>препятствия (неподконтрольные машины, разрушающиеся/появляющиеся внезапно здания, светофоры с кнопкой и т.п.)</a:t>
-            </a:r>
-            <a:endParaRPr lang="ru-RU" sz="1400" dirty="0">
-              <a:latin typeface="Calibri" panose="020F0502020204030204" pitchFamily="34" charset="0"/>
-              <a:ea typeface="Calibri" panose="020F0502020204030204" pitchFamily="34" charset="0"/>
-              <a:cs typeface="Times New Roman" panose="02020603050405020304" pitchFamily="18" charset="0"/>
-            </a:endParaRPr>
-          </a:p>
-          <a:p>
-            <a:pPr lvl="0">
-              <a:lnSpc>
-                <a:spcPct val="150000"/>
-              </a:lnSpc>
-              <a:spcAft>
-                <a:spcPts val="0"/>
-              </a:spcAft>
-            </a:pPr>
-            <a:r>
-              <a:rPr lang="ru-RU" sz="1400" dirty="0" smtClean="0">
-                <a:latin typeface="Arial" panose="020B0604020202020204" pitchFamily="34" charset="0"/>
-                <a:ea typeface="TimesNewRomanPSMT"/>
-                <a:cs typeface="Times New Roman" panose="02020603050405020304" pitchFamily="18" charset="0"/>
-              </a:rPr>
-              <a:t>3. Время </a:t>
-            </a:r>
-            <a:r>
-              <a:rPr lang="ru-RU" sz="1400" dirty="0">
-                <a:latin typeface="Arial" panose="020B0604020202020204" pitchFamily="34" charset="0"/>
-                <a:ea typeface="TimesNewRomanPSMT"/>
-                <a:cs typeface="Times New Roman" panose="02020603050405020304" pitchFamily="18" charset="0"/>
-              </a:rPr>
-              <a:t>отклика системы: 1 секунда (инструкции под новые условия должны появиться уже через секунду).</a:t>
-            </a:r>
-            <a:endParaRPr lang="ru-RU" sz="1400" dirty="0">
-              <a:latin typeface="Calibri" panose="020F0502020204030204" pitchFamily="34" charset="0"/>
-              <a:ea typeface="Calibri" panose="020F0502020204030204" pitchFamily="34" charset="0"/>
-              <a:cs typeface="Times New Roman" panose="02020603050405020304" pitchFamily="18" charset="0"/>
-            </a:endParaRPr>
-          </a:p>
-          <a:p>
-            <a:pPr marL="228600">
-              <a:lnSpc>
-                <a:spcPct val="150000"/>
-              </a:lnSpc>
-              <a:spcAft>
-                <a:spcPts val="0"/>
-              </a:spcAft>
-            </a:pPr>
-            <a:r>
-              <a:rPr lang="ru-RU" sz="1400" dirty="0">
-                <a:latin typeface="Arial" panose="020B0604020202020204" pitchFamily="34" charset="0"/>
-                <a:ea typeface="TimesNewRomanPSMT"/>
-                <a:cs typeface="Times New Roman" panose="02020603050405020304" pitchFamily="18" charset="0"/>
-              </a:rPr>
-              <a:t>        Машины перемещаются по квадратам, около каждой машины спереди всегда есть свободный квадрат. На тот момент, когда машина переместиться на следующий квадрат, уже должны быть новые инструкции под новые условия.</a:t>
-            </a:r>
-            <a:endParaRPr lang="ru-RU" sz="1400" dirty="0">
-              <a:latin typeface="Calibri" panose="020F0502020204030204" pitchFamily="34" charset="0"/>
-              <a:ea typeface="Calibri" panose="020F0502020204030204" pitchFamily="34" charset="0"/>
-              <a:cs typeface="Times New Roman" panose="02020603050405020304" pitchFamily="18" charset="0"/>
-            </a:endParaRPr>
-          </a:p>
-          <a:p>
-            <a:pPr lvl="0">
-              <a:lnSpc>
-                <a:spcPct val="150000"/>
-              </a:lnSpc>
-              <a:spcAft>
-                <a:spcPts val="0"/>
-              </a:spcAft>
-            </a:pPr>
-            <a:r>
-              <a:rPr lang="ru-RU" sz="1400" dirty="0" smtClean="0">
-                <a:latin typeface="Arial" panose="020B0604020202020204" pitchFamily="34" charset="0"/>
-                <a:ea typeface="TimesNewRomanPSMT"/>
-                <a:cs typeface="Times New Roman" panose="02020603050405020304" pitchFamily="18" charset="0"/>
-              </a:rPr>
-              <a:t>4. Машины </a:t>
-            </a:r>
-            <a:r>
-              <a:rPr lang="ru-RU" sz="1400" dirty="0">
-                <a:latin typeface="Arial" panose="020B0604020202020204" pitchFamily="34" charset="0"/>
-                <a:ea typeface="TimesNewRomanPSMT"/>
-                <a:cs typeface="Times New Roman" panose="02020603050405020304" pitchFamily="18" charset="0"/>
-              </a:rPr>
-              <a:t>к системе ЦКА могут подключаться/отключаться внезапно.</a:t>
-            </a:r>
-            <a:endParaRPr lang="ru-RU" sz="1400" dirty="0">
-              <a:effectLst/>
-              <a:latin typeface="Calibri" panose="020F0502020204030204" pitchFamily="34" charset="0"/>
-              <a:ea typeface="Calibri" panose="020F0502020204030204" pitchFamily="34" charset="0"/>
-              <a:cs typeface="Times New Roman" panose="02020603050405020304" pitchFamily="18" charset="0"/>
-            </a:endParaRPr>
+              <a:buFont typeface="Arial" charset="0"/>
+              <a:buChar char="»"/>
+              <a:defRPr sz="2000" kern="1200">
+                <a:solidFill>
+                  <a:schemeClr val="tx1"/>
+                </a:solidFill>
+                <a:latin typeface="+mn-lt"/>
+                <a:ea typeface="+mn-ea"/>
+                <a:cs typeface="+mn-cs"/>
+              </a:defRPr>
+            </a:lvl5pPr>
+            <a:lvl6pPr marL="2514600" indent="-228600" algn="l" defTabSz="914400" rtl="0" eaLnBrk="1" latinLnBrk="0" hangingPunct="1">
+              <a:spcBef>
+                <a:spcPct val="20000"/>
+              </a:spcBef>
+              <a:buFont typeface="Arial" pitchFamily="34" charset="0"/>
+              <a:buChar char="•"/>
+              <a:defRPr sz="2000" kern="1200">
+                <a:solidFill>
+                  <a:schemeClr val="tx1"/>
+                </a:solidFill>
+                <a:latin typeface="+mn-lt"/>
+                <a:ea typeface="+mn-ea"/>
+                <a:cs typeface="+mn-cs"/>
+              </a:defRPr>
+            </a:lvl6pPr>
+            <a:lvl7pPr marL="2971800" indent="-228600" algn="l" defTabSz="914400" rtl="0" eaLnBrk="1" latinLnBrk="0" hangingPunct="1">
+              <a:spcBef>
+                <a:spcPct val="20000"/>
+              </a:spcBef>
+              <a:buFont typeface="Arial" pitchFamily="34" charset="0"/>
+              <a:buChar char="•"/>
+              <a:defRPr sz="2000" kern="1200">
+                <a:solidFill>
+                  <a:schemeClr val="tx1"/>
+                </a:solidFill>
+                <a:latin typeface="+mn-lt"/>
+                <a:ea typeface="+mn-ea"/>
+                <a:cs typeface="+mn-cs"/>
+              </a:defRPr>
+            </a:lvl7pPr>
+            <a:lvl8pPr marL="3429000" indent="-228600" algn="l" defTabSz="914400" rtl="0" eaLnBrk="1" latinLnBrk="0" hangingPunct="1">
+              <a:spcBef>
+                <a:spcPct val="20000"/>
+              </a:spcBef>
+              <a:buFont typeface="Arial" pitchFamily="34" charset="0"/>
+              <a:buChar char="•"/>
+              <a:defRPr sz="2000" kern="1200">
+                <a:solidFill>
+                  <a:schemeClr val="tx1"/>
+                </a:solidFill>
+                <a:latin typeface="+mn-lt"/>
+                <a:ea typeface="+mn-ea"/>
+                <a:cs typeface="+mn-cs"/>
+              </a:defRPr>
+            </a:lvl8pPr>
+            <a:lvl9pPr marL="3886200" indent="-228600" algn="l" defTabSz="914400" rtl="0" eaLnBrk="1" latinLnBrk="0" hangingPunct="1">
+              <a:spcBef>
+                <a:spcPct val="20000"/>
+              </a:spcBef>
+              <a:buFont typeface="Arial" pitchFamily="34" charset="0"/>
+              <a:buChar char="•"/>
+              <a:defRPr sz="2000" kern="1200">
+                <a:solidFill>
+                  <a:schemeClr val="tx1"/>
+                </a:solidFill>
+                <a:latin typeface="+mn-lt"/>
+                <a:ea typeface="+mn-ea"/>
+                <a:cs typeface="+mn-cs"/>
+              </a:defRPr>
+            </a:lvl9pPr>
+          </a:lstStyle>
+          <a:p>
+            <a:r>
+              <a:rPr lang="ru-RU" dirty="0" smtClean="0"/>
+              <a:t>Пространственно-временной </a:t>
+            </a:r>
+            <a:r>
+              <a:rPr lang="en-US" dirty="0" smtClean="0"/>
+              <a:t>A</a:t>
+            </a:r>
+            <a:r>
+              <a:rPr lang="ru-RU" dirty="0" smtClean="0"/>
+              <a:t>-</a:t>
+            </a:r>
+            <a:r>
+              <a:rPr lang="en-US" dirty="0" smtClean="0"/>
+              <a:t>Star </a:t>
+            </a:r>
+            <a:r>
+              <a:rPr lang="ru-RU" dirty="0" smtClean="0"/>
+              <a:t>с приоритетом обхода по заранее построенному графу эталонных маршрутов.</a:t>
+            </a:r>
+            <a:endParaRPr lang="ru-RU" dirty="0"/>
           </a:p>
         </p:txBody>
       </p:sp>
     </p:spTree>
     <p:extLst>
       <p:ext uri="{BB962C8B-B14F-4D97-AF65-F5344CB8AC3E}">
-        <p14:creationId xmlns:p14="http://schemas.microsoft.com/office/powerpoint/2010/main" val="3118536209"/>
+        <p14:creationId xmlns:p14="http://schemas.microsoft.com/office/powerpoint/2010/main" val="4226238554"/>
       </p:ext>
     </p:extLst>
   </p:cSld>
@@ -5817,6 +6984,38 @@
           </a:p>
         </p:txBody>
       </p:sp>
+      <p:pic>
+        <p:nvPicPr>
+          <p:cNvPr id="6" name="Объект 5"/>
+          <p:cNvPicPr>
+            <a:picLocks noGrp="1" noChangeAspect="1"/>
+          </p:cNvPicPr>
+          <p:nvPr>
+            <p:ph idx="1"/>
+          </p:nvPr>
+        </p:nvPicPr>
+        <p:blipFill>
+          <a:blip r:embed="rId3">
+            <a:extLst>
+              <a:ext uri="{28A0092B-C50C-407E-A947-70E740481C1C}">
+                <a14:useLocalDpi xmlns:a14="http://schemas.microsoft.com/office/drawing/2010/main" val="0"/>
+              </a:ext>
+            </a:extLst>
+          </a:blip>
+          <a:stretch>
+            <a:fillRect/>
+          </a:stretch>
+        </p:blipFill>
+        <p:spPr>
+          <a:xfrm>
+            <a:off x="107504" y="2262387"/>
+            <a:ext cx="6939939" cy="4580359"/>
+          </a:xfrm>
+          <a:prstGeom prst="rect">
+            <a:avLst/>
+          </a:prstGeom>
+        </p:spPr>
+      </p:pic>
       <p:sp>
         <p:nvSpPr>
           <p:cNvPr id="4" name="Номер слайда 3"/>
@@ -5848,98 +7047,14 @@
       </p:sp>
       <p:sp>
         <p:nvSpPr>
-          <p:cNvPr id="3" name="Объект 2"/>
-          <p:cNvSpPr>
-            <a:spLocks noGrp="1"/>
-          </p:cNvSpPr>
-          <p:nvPr>
-            <p:ph idx="1"/>
-          </p:nvPr>
+          <p:cNvPr id="7" name="TextBox 6"/>
+          <p:cNvSpPr txBox="1"/>
+          <p:nvPr/>
         </p:nvSpPr>
         <p:spPr>
           <a:xfrm>
-            <a:off x="457200" y="1844824"/>
-            <a:ext cx="8229600" cy="4281339"/>
-          </a:xfrm>
-        </p:spPr>
-        <p:txBody>
-          <a:bodyPr/>
-          <a:lstStyle/>
-          <a:p>
-            <a:r>
-              <a:rPr lang="ru-RU" dirty="0"/>
-              <a:t>Пространственно-временной </a:t>
-            </a:r>
-            <a:r>
-              <a:rPr lang="en-US" dirty="0"/>
-              <a:t>A</a:t>
-            </a:r>
-            <a:r>
-              <a:rPr lang="ru-RU" dirty="0"/>
-              <a:t>-</a:t>
-            </a:r>
-            <a:r>
-              <a:rPr lang="en-US" dirty="0"/>
-              <a:t>Star </a:t>
-            </a:r>
-            <a:r>
-              <a:rPr lang="ru-RU" dirty="0"/>
-              <a:t>с ориентацией на заранее построенный граф эталонных маршрутов.</a:t>
-            </a:r>
-          </a:p>
-          <a:p>
-            <a:r>
-              <a:rPr lang="ru-RU" dirty="0" smtClean="0"/>
-              <a:t>Граф </a:t>
-            </a:r>
-            <a:r>
-              <a:rPr lang="ru-RU" dirty="0"/>
-              <a:t>эталонных маршрутов построен при помощи алгоритма </a:t>
-            </a:r>
-            <a:r>
-              <a:rPr lang="ru-RU" dirty="0" err="1"/>
-              <a:t>Флойда</a:t>
-            </a:r>
-            <a:r>
-              <a:rPr lang="ru-RU" dirty="0"/>
-              <a:t> (но возможно будет использоваться алгоритм </a:t>
-            </a:r>
-            <a:r>
-              <a:rPr lang="ru-RU" dirty="0" err="1"/>
-              <a:t>Дейкстры</a:t>
-            </a:r>
-            <a:r>
-              <a:rPr lang="ru-RU" dirty="0"/>
-              <a:t>).</a:t>
-            </a:r>
-          </a:p>
-          <a:p>
-            <a:r>
-              <a:rPr lang="ru-RU" dirty="0" smtClean="0"/>
-              <a:t>Под </a:t>
-            </a:r>
-            <a:r>
-              <a:rPr lang="ru-RU" dirty="0"/>
-              <a:t>ориентацией имеется ввиду построение приоритета обхода графа, при помощи эталонных маршрутов</a:t>
-            </a:r>
-            <a:r>
-              <a:rPr lang="ru-RU" dirty="0" smtClean="0"/>
-              <a:t>.</a:t>
-            </a:r>
-            <a:endParaRPr lang="ru-RU" dirty="0"/>
-          </a:p>
-        </p:txBody>
-      </p:sp>
-      <p:sp>
-        <p:nvSpPr>
-          <p:cNvPr id="8" name="TextBox 7"/>
-          <p:cNvSpPr txBox="1"/>
-          <p:nvPr/>
-        </p:nvSpPr>
-        <p:spPr>
-          <a:xfrm>
-            <a:off x="1285852" y="889842"/>
-            <a:ext cx="6382492" cy="1015663"/>
+            <a:off x="1378626" y="1174962"/>
+            <a:ext cx="6386748" cy="553998"/>
           </a:xfrm>
           <a:prstGeom prst="rect">
             <a:avLst/>
@@ -5947,16 +7062,28 @@
           <a:noFill/>
         </p:spPr>
         <p:txBody>
-          <a:bodyPr wrap="square" rtlCol="0">
+          <a:bodyPr wrap="none" rtlCol="0">
             <a:spAutoFit/>
           </a:bodyPr>
           <a:lstStyle/>
           <a:p>
             <a:r>
+              <a:rPr lang="ru-RU" sz="3000" dirty="0">
+                <a:latin typeface="+mj-lt"/>
+              </a:rPr>
+              <a:t>Х</a:t>
+            </a:r>
+            <a:r>
               <a:rPr lang="ru-RU" sz="3000" dirty="0" smtClean="0">
                 <a:latin typeface="+mj-lt"/>
               </a:rPr>
-              <a:t>Алгоритм централизованной раздачи маршрутов автопилотам</a:t>
+              <a:t>ранени</a:t>
+            </a:r>
+            <a:r>
+              <a:rPr lang="ru-RU" sz="3000" dirty="0" smtClean="0">
+                <a:latin typeface="+mj-lt"/>
+              </a:rPr>
+              <a:t>е истории движения машины</a:t>
             </a:r>
             <a:endParaRPr lang="ru-RU" sz="3000" dirty="0">
               <a:latin typeface="+mj-lt"/>
@@ -5964,10 +7091,229 @@
           </a:p>
         </p:txBody>
       </p:sp>
+      <p:sp>
+        <p:nvSpPr>
+          <p:cNvPr id="11" name="Объект 2"/>
+          <p:cNvSpPr txBox="1">
+            <a:spLocks/>
+          </p:cNvSpPr>
+          <p:nvPr/>
+        </p:nvSpPr>
+        <p:spPr bwMode="auto">
+          <a:xfrm>
+            <a:off x="4788024" y="1628800"/>
+            <a:ext cx="4320480" cy="4281339"/>
+          </a:xfrm>
+          <a:prstGeom prst="rect">
+            <a:avLst/>
+          </a:prstGeom>
+          <a:noFill/>
+          <a:ln w="9525">
+            <a:noFill/>
+            <a:miter lim="800000"/>
+            <a:headEnd/>
+            <a:tailEnd/>
+          </a:ln>
+        </p:spPr>
+        <p:txBody>
+          <a:bodyPr vert="horz" wrap="square" lIns="91440" tIns="45720" rIns="91440" bIns="45720" numCol="1" anchor="t" anchorCtr="0" compatLnSpc="1">
+            <a:prstTxWarp prst="textNoShape">
+              <a:avLst/>
+            </a:prstTxWarp>
+          </a:bodyPr>
+          <a:lstStyle>
+            <a:lvl1pPr marL="342900" indent="-342900" algn="l" rtl="0" fontAlgn="base">
+              <a:spcBef>
+                <a:spcPct val="20000"/>
+              </a:spcBef>
+              <a:spcAft>
+                <a:spcPct val="0"/>
+              </a:spcAft>
+              <a:buFont typeface="Arial" charset="0"/>
+              <a:buChar char="•"/>
+              <a:defRPr sz="3000" kern="1200">
+                <a:solidFill>
+                  <a:schemeClr val="tx1"/>
+                </a:solidFill>
+                <a:latin typeface="+mn-lt"/>
+                <a:ea typeface="+mn-ea"/>
+                <a:cs typeface="+mn-cs"/>
+              </a:defRPr>
+            </a:lvl1pPr>
+            <a:lvl2pPr marL="742950" indent="-285750" algn="l" rtl="0" fontAlgn="base">
+              <a:spcBef>
+                <a:spcPct val="20000"/>
+              </a:spcBef>
+              <a:spcAft>
+                <a:spcPct val="0"/>
+              </a:spcAft>
+              <a:buFont typeface="Arial" charset="0"/>
+              <a:buChar char="–"/>
+              <a:defRPr sz="2600" kern="1200">
+                <a:solidFill>
+                  <a:schemeClr val="tx1"/>
+                </a:solidFill>
+                <a:latin typeface="+mn-lt"/>
+                <a:ea typeface="+mn-ea"/>
+                <a:cs typeface="+mn-cs"/>
+              </a:defRPr>
+            </a:lvl2pPr>
+            <a:lvl3pPr marL="1143000" indent="-228600" algn="l" rtl="0" fontAlgn="base">
+              <a:spcBef>
+                <a:spcPct val="20000"/>
+              </a:spcBef>
+              <a:spcAft>
+                <a:spcPct val="0"/>
+              </a:spcAft>
+              <a:buFont typeface="Arial" charset="0"/>
+              <a:buChar char="•"/>
+              <a:defRPr sz="2400" kern="1200">
+                <a:solidFill>
+                  <a:schemeClr val="tx1"/>
+                </a:solidFill>
+                <a:latin typeface="+mn-lt"/>
+                <a:ea typeface="+mn-ea"/>
+                <a:cs typeface="+mn-cs"/>
+              </a:defRPr>
+            </a:lvl3pPr>
+            <a:lvl4pPr marL="1600200" indent="-228600" algn="l" rtl="0" fontAlgn="base">
+              <a:spcBef>
+                <a:spcPct val="20000"/>
+              </a:spcBef>
+              <a:spcAft>
+                <a:spcPct val="0"/>
+              </a:spcAft>
+              <a:buFont typeface="Arial" charset="0"/>
+              <a:buChar char="–"/>
+              <a:defRPr sz="2000" kern="1200">
+                <a:solidFill>
+                  <a:schemeClr val="tx1"/>
+                </a:solidFill>
+                <a:latin typeface="+mn-lt"/>
+                <a:ea typeface="+mn-ea"/>
+                <a:cs typeface="+mn-cs"/>
+              </a:defRPr>
+            </a:lvl4pPr>
+            <a:lvl5pPr marL="2057400" indent="-228600" algn="l" rtl="0" fontAlgn="base">
+              <a:spcBef>
+                <a:spcPct val="20000"/>
+              </a:spcBef>
+              <a:spcAft>
+                <a:spcPct val="0"/>
+              </a:spcAft>
+              <a:buFont typeface="Arial" charset="0"/>
+              <a:buChar char="»"/>
+              <a:defRPr sz="2000" kern="1200">
+                <a:solidFill>
+                  <a:schemeClr val="tx1"/>
+                </a:solidFill>
+                <a:latin typeface="+mn-lt"/>
+                <a:ea typeface="+mn-ea"/>
+                <a:cs typeface="+mn-cs"/>
+              </a:defRPr>
+            </a:lvl5pPr>
+            <a:lvl6pPr marL="2514600" indent="-228600" algn="l" defTabSz="914400" rtl="0" eaLnBrk="1" latinLnBrk="0" hangingPunct="1">
+              <a:spcBef>
+                <a:spcPct val="20000"/>
+              </a:spcBef>
+              <a:buFont typeface="Arial" pitchFamily="34" charset="0"/>
+              <a:buChar char="•"/>
+              <a:defRPr sz="2000" kern="1200">
+                <a:solidFill>
+                  <a:schemeClr val="tx1"/>
+                </a:solidFill>
+                <a:latin typeface="+mn-lt"/>
+                <a:ea typeface="+mn-ea"/>
+                <a:cs typeface="+mn-cs"/>
+              </a:defRPr>
+            </a:lvl6pPr>
+            <a:lvl7pPr marL="2971800" indent="-228600" algn="l" defTabSz="914400" rtl="0" eaLnBrk="1" latinLnBrk="0" hangingPunct="1">
+              <a:spcBef>
+                <a:spcPct val="20000"/>
+              </a:spcBef>
+              <a:buFont typeface="Arial" pitchFamily="34" charset="0"/>
+              <a:buChar char="•"/>
+              <a:defRPr sz="2000" kern="1200">
+                <a:solidFill>
+                  <a:schemeClr val="tx1"/>
+                </a:solidFill>
+                <a:latin typeface="+mn-lt"/>
+                <a:ea typeface="+mn-ea"/>
+                <a:cs typeface="+mn-cs"/>
+              </a:defRPr>
+            </a:lvl7pPr>
+            <a:lvl8pPr marL="3429000" indent="-228600" algn="l" defTabSz="914400" rtl="0" eaLnBrk="1" latinLnBrk="0" hangingPunct="1">
+              <a:spcBef>
+                <a:spcPct val="20000"/>
+              </a:spcBef>
+              <a:buFont typeface="Arial" pitchFamily="34" charset="0"/>
+              <a:buChar char="•"/>
+              <a:defRPr sz="2000" kern="1200">
+                <a:solidFill>
+                  <a:schemeClr val="tx1"/>
+                </a:solidFill>
+                <a:latin typeface="+mn-lt"/>
+                <a:ea typeface="+mn-ea"/>
+                <a:cs typeface="+mn-cs"/>
+              </a:defRPr>
+            </a:lvl8pPr>
+            <a:lvl9pPr marL="3886200" indent="-228600" algn="l" defTabSz="914400" rtl="0" eaLnBrk="1" latinLnBrk="0" hangingPunct="1">
+              <a:spcBef>
+                <a:spcPct val="20000"/>
+              </a:spcBef>
+              <a:buFont typeface="Arial" pitchFamily="34" charset="0"/>
+              <a:buChar char="•"/>
+              <a:defRPr sz="2000" kern="1200">
+                <a:solidFill>
+                  <a:schemeClr val="tx1"/>
+                </a:solidFill>
+                <a:latin typeface="+mn-lt"/>
+                <a:ea typeface="+mn-ea"/>
+                <a:cs typeface="+mn-cs"/>
+              </a:defRPr>
+            </a:lvl9pPr>
+          </a:lstStyle>
+          <a:p>
+            <a:r>
+              <a:rPr lang="ru-RU" b="1" dirty="0" smtClean="0"/>
+              <a:t>Пространственно-временной</a:t>
+            </a:r>
+            <a:r>
+              <a:rPr lang="ru-RU" dirty="0" smtClean="0"/>
+              <a:t> </a:t>
+            </a:r>
+            <a:r>
+              <a:rPr lang="en-US" dirty="0" smtClean="0"/>
+              <a:t>A</a:t>
+            </a:r>
+            <a:r>
+              <a:rPr lang="ru-RU" dirty="0" smtClean="0"/>
+              <a:t>-</a:t>
+            </a:r>
+            <a:r>
+              <a:rPr lang="en-US" dirty="0" smtClean="0"/>
+              <a:t>Star</a:t>
+            </a:r>
+            <a:r>
+              <a:rPr lang="ru-RU" dirty="0" smtClean="0"/>
+              <a:t> с</a:t>
+            </a:r>
+            <a:r>
+              <a:rPr lang="en-US" dirty="0" smtClean="0"/>
+              <a:t> </a:t>
+            </a:r>
+            <a:r>
+              <a:rPr lang="ru-RU" dirty="0" smtClean="0"/>
+              <a:t>приоритетом обхода по заранее построенному графу эталонных маршрутов.</a:t>
+            </a:r>
+            <a:endParaRPr lang="ru-RU" dirty="0"/>
+          </a:p>
+        </p:txBody>
+      </p:sp>
     </p:spTree>
     <p:extLst>
       <p:ext uri="{BB962C8B-B14F-4D97-AF65-F5344CB8AC3E}">
-        <p14:creationId xmlns:p14="http://schemas.microsoft.com/office/powerpoint/2010/main" val="4226238554"/>
+        <p14:creationId xmlns:p14="http://schemas.microsoft.com/office/powerpoint/2010/main" val="888645456"/>
       </p:ext>
     </p:extLst>
   </p:cSld>
@@ -6054,94 +7400,6 @@
       </p:sp>
       <p:sp>
         <p:nvSpPr>
-          <p:cNvPr id="3" name="Объект 2"/>
-          <p:cNvSpPr>
-            <a:spLocks noGrp="1"/>
-          </p:cNvSpPr>
-          <p:nvPr>
-            <p:ph idx="1"/>
-          </p:nvPr>
-        </p:nvSpPr>
-        <p:spPr>
-          <a:xfrm>
-            <a:off x="457200" y="1844824"/>
-            <a:ext cx="8229600" cy="4281339"/>
-          </a:xfrm>
-        </p:spPr>
-        <p:txBody>
-          <a:bodyPr/>
-          <a:lstStyle/>
-          <a:p>
-            <a:r>
-              <a:rPr lang="ru-RU" b="1" dirty="0"/>
-              <a:t>Пространственно-временной</a:t>
-            </a:r>
-            <a:r>
-              <a:rPr lang="ru-RU" dirty="0"/>
-              <a:t> </a:t>
-            </a:r>
-            <a:r>
-              <a:rPr lang="en-US" dirty="0"/>
-              <a:t>A</a:t>
-            </a:r>
-            <a:r>
-              <a:rPr lang="ru-RU" dirty="0"/>
-              <a:t>-</a:t>
-            </a:r>
-            <a:r>
-              <a:rPr lang="en-US" dirty="0"/>
-              <a:t>Star </a:t>
-            </a:r>
-            <a:r>
-              <a:rPr lang="ru-RU" dirty="0"/>
-              <a:t>с ориентацией на заранее построенный граф эталонных маршрутов.</a:t>
-            </a:r>
-          </a:p>
-          <a:p>
-            <a:r>
-              <a:rPr lang="ru-RU" dirty="0" smtClean="0"/>
-              <a:t>Граф </a:t>
-            </a:r>
-            <a:r>
-              <a:rPr lang="ru-RU" dirty="0"/>
-              <a:t>эталонных маршрутов построен при помощи алгоритма </a:t>
-            </a:r>
-            <a:r>
-              <a:rPr lang="ru-RU" dirty="0" err="1"/>
-              <a:t>Флойда</a:t>
-            </a:r>
-            <a:r>
-              <a:rPr lang="ru-RU" dirty="0"/>
-              <a:t> (но возможно будет использоваться алгоритм </a:t>
-            </a:r>
-            <a:r>
-              <a:rPr lang="ru-RU" dirty="0" err="1"/>
-              <a:t>Дейкстры</a:t>
-            </a:r>
-            <a:r>
-              <a:rPr lang="ru-RU" dirty="0"/>
-              <a:t>).</a:t>
-            </a:r>
-          </a:p>
-          <a:p>
-            <a:r>
-              <a:rPr lang="ru-RU" dirty="0" smtClean="0"/>
-              <a:t>Под </a:t>
-            </a:r>
-            <a:r>
-              <a:rPr lang="ru-RU" dirty="0"/>
-              <a:t>ориентацией имеется ввиду построение приоритета обхода графа, при помощи эталонных маршрутов</a:t>
-            </a:r>
-            <a:r>
-              <a:rPr lang="ru-RU" dirty="0" smtClean="0"/>
-              <a:t>.</a:t>
-            </a:r>
-            <a:endParaRPr lang="ru-RU" dirty="0"/>
-          </a:p>
-        </p:txBody>
-      </p:sp>
-      <p:sp>
-        <p:nvSpPr>
           <p:cNvPr id="8" name="TextBox 7"/>
           <p:cNvSpPr txBox="1"/>
           <p:nvPr/>
@@ -6174,10 +7432,251 @@
           </a:p>
         </p:txBody>
       </p:sp>
+      <p:pic>
+        <p:nvPicPr>
+          <p:cNvPr id="6" name="Рисунок 5"/>
+          <p:cNvPicPr>
+            <a:picLocks noChangeAspect="1"/>
+          </p:cNvPicPr>
+          <p:nvPr/>
+        </p:nvPicPr>
+        <p:blipFill>
+          <a:blip r:embed="rId3">
+            <a:extLst>
+              <a:ext uri="{28A0092B-C50C-407E-A947-70E740481C1C}">
+                <a14:useLocalDpi xmlns:a14="http://schemas.microsoft.com/office/drawing/2010/main" val="0"/>
+              </a:ext>
+            </a:extLst>
+          </a:blip>
+          <a:stretch>
+            <a:fillRect/>
+          </a:stretch>
+        </p:blipFill>
+        <p:spPr>
+          <a:xfrm>
+            <a:off x="611560" y="2231422"/>
+            <a:ext cx="3295650" cy="3352800"/>
+          </a:xfrm>
+          <a:prstGeom prst="rect">
+            <a:avLst/>
+          </a:prstGeom>
+        </p:spPr>
+      </p:pic>
+      <p:sp>
+        <p:nvSpPr>
+          <p:cNvPr id="10" name="Объект 2"/>
+          <p:cNvSpPr txBox="1">
+            <a:spLocks/>
+          </p:cNvSpPr>
+          <p:nvPr/>
+        </p:nvSpPr>
+        <p:spPr bwMode="auto">
+          <a:xfrm>
+            <a:off x="4788024" y="1628800"/>
+            <a:ext cx="4536504" cy="4281339"/>
+          </a:xfrm>
+          <a:prstGeom prst="rect">
+            <a:avLst/>
+          </a:prstGeom>
+          <a:noFill/>
+          <a:ln w="9525">
+            <a:noFill/>
+            <a:miter lim="800000"/>
+            <a:headEnd/>
+            <a:tailEnd/>
+          </a:ln>
+        </p:spPr>
+        <p:txBody>
+          <a:bodyPr vert="horz" wrap="square" lIns="91440" tIns="45720" rIns="91440" bIns="45720" numCol="1" anchor="t" anchorCtr="0" compatLnSpc="1">
+            <a:prstTxWarp prst="textNoShape">
+              <a:avLst/>
+            </a:prstTxWarp>
+          </a:bodyPr>
+          <a:lstStyle>
+            <a:lvl1pPr marL="342900" indent="-342900" algn="l" rtl="0" fontAlgn="base">
+              <a:spcBef>
+                <a:spcPct val="20000"/>
+              </a:spcBef>
+              <a:spcAft>
+                <a:spcPct val="0"/>
+              </a:spcAft>
+              <a:buFont typeface="Arial" charset="0"/>
+              <a:buChar char="•"/>
+              <a:defRPr sz="3000" kern="1200">
+                <a:solidFill>
+                  <a:schemeClr val="tx1"/>
+                </a:solidFill>
+                <a:latin typeface="+mn-lt"/>
+                <a:ea typeface="+mn-ea"/>
+                <a:cs typeface="+mn-cs"/>
+              </a:defRPr>
+            </a:lvl1pPr>
+            <a:lvl2pPr marL="742950" indent="-285750" algn="l" rtl="0" fontAlgn="base">
+              <a:spcBef>
+                <a:spcPct val="20000"/>
+              </a:spcBef>
+              <a:spcAft>
+                <a:spcPct val="0"/>
+              </a:spcAft>
+              <a:buFont typeface="Arial" charset="0"/>
+              <a:buChar char="–"/>
+              <a:defRPr sz="2600" kern="1200">
+                <a:solidFill>
+                  <a:schemeClr val="tx1"/>
+                </a:solidFill>
+                <a:latin typeface="+mn-lt"/>
+                <a:ea typeface="+mn-ea"/>
+                <a:cs typeface="+mn-cs"/>
+              </a:defRPr>
+            </a:lvl2pPr>
+            <a:lvl3pPr marL="1143000" indent="-228600" algn="l" rtl="0" fontAlgn="base">
+              <a:spcBef>
+                <a:spcPct val="20000"/>
+              </a:spcBef>
+              <a:spcAft>
+                <a:spcPct val="0"/>
+              </a:spcAft>
+              <a:buFont typeface="Arial" charset="0"/>
+              <a:buChar char="•"/>
+              <a:defRPr sz="2400" kern="1200">
+                <a:solidFill>
+                  <a:schemeClr val="tx1"/>
+                </a:solidFill>
+                <a:latin typeface="+mn-lt"/>
+                <a:ea typeface="+mn-ea"/>
+                <a:cs typeface="+mn-cs"/>
+              </a:defRPr>
+            </a:lvl3pPr>
+            <a:lvl4pPr marL="1600200" indent="-228600" algn="l" rtl="0" fontAlgn="base">
+              <a:spcBef>
+                <a:spcPct val="20000"/>
+              </a:spcBef>
+              <a:spcAft>
+                <a:spcPct val="0"/>
+              </a:spcAft>
+              <a:buFont typeface="Arial" charset="0"/>
+              <a:buChar char="–"/>
+              <a:defRPr sz="2000" kern="1200">
+                <a:solidFill>
+                  <a:schemeClr val="tx1"/>
+                </a:solidFill>
+                <a:latin typeface="+mn-lt"/>
+                <a:ea typeface="+mn-ea"/>
+                <a:cs typeface="+mn-cs"/>
+              </a:defRPr>
+            </a:lvl4pPr>
+            <a:lvl5pPr marL="2057400" indent="-228600" algn="l" rtl="0" fontAlgn="base">
+              <a:spcBef>
+                <a:spcPct val="20000"/>
+              </a:spcBef>
+              <a:spcAft>
+                <a:spcPct val="0"/>
+              </a:spcAft>
+              <a:buFont typeface="Arial" charset="0"/>
+              <a:buChar char="»"/>
+              <a:defRPr sz="2000" kern="1200">
+                <a:solidFill>
+                  <a:schemeClr val="tx1"/>
+                </a:solidFill>
+                <a:latin typeface="+mn-lt"/>
+                <a:ea typeface="+mn-ea"/>
+                <a:cs typeface="+mn-cs"/>
+              </a:defRPr>
+            </a:lvl5pPr>
+            <a:lvl6pPr marL="2514600" indent="-228600" algn="l" defTabSz="914400" rtl="0" eaLnBrk="1" latinLnBrk="0" hangingPunct="1">
+              <a:spcBef>
+                <a:spcPct val="20000"/>
+              </a:spcBef>
+              <a:buFont typeface="Arial" pitchFamily="34" charset="0"/>
+              <a:buChar char="•"/>
+              <a:defRPr sz="2000" kern="1200">
+                <a:solidFill>
+                  <a:schemeClr val="tx1"/>
+                </a:solidFill>
+                <a:latin typeface="+mn-lt"/>
+                <a:ea typeface="+mn-ea"/>
+                <a:cs typeface="+mn-cs"/>
+              </a:defRPr>
+            </a:lvl6pPr>
+            <a:lvl7pPr marL="2971800" indent="-228600" algn="l" defTabSz="914400" rtl="0" eaLnBrk="1" latinLnBrk="0" hangingPunct="1">
+              <a:spcBef>
+                <a:spcPct val="20000"/>
+              </a:spcBef>
+              <a:buFont typeface="Arial" pitchFamily="34" charset="0"/>
+              <a:buChar char="•"/>
+              <a:defRPr sz="2000" kern="1200">
+                <a:solidFill>
+                  <a:schemeClr val="tx1"/>
+                </a:solidFill>
+                <a:latin typeface="+mn-lt"/>
+                <a:ea typeface="+mn-ea"/>
+                <a:cs typeface="+mn-cs"/>
+              </a:defRPr>
+            </a:lvl7pPr>
+            <a:lvl8pPr marL="3429000" indent="-228600" algn="l" defTabSz="914400" rtl="0" eaLnBrk="1" latinLnBrk="0" hangingPunct="1">
+              <a:spcBef>
+                <a:spcPct val="20000"/>
+              </a:spcBef>
+              <a:buFont typeface="Arial" pitchFamily="34" charset="0"/>
+              <a:buChar char="•"/>
+              <a:defRPr sz="2000" kern="1200">
+                <a:solidFill>
+                  <a:schemeClr val="tx1"/>
+                </a:solidFill>
+                <a:latin typeface="+mn-lt"/>
+                <a:ea typeface="+mn-ea"/>
+                <a:cs typeface="+mn-cs"/>
+              </a:defRPr>
+            </a:lvl8pPr>
+            <a:lvl9pPr marL="3886200" indent="-228600" algn="l" defTabSz="914400" rtl="0" eaLnBrk="1" latinLnBrk="0" hangingPunct="1">
+              <a:spcBef>
+                <a:spcPct val="20000"/>
+              </a:spcBef>
+              <a:buFont typeface="Arial" pitchFamily="34" charset="0"/>
+              <a:buChar char="•"/>
+              <a:defRPr sz="2000" kern="1200">
+                <a:solidFill>
+                  <a:schemeClr val="tx1"/>
+                </a:solidFill>
+                <a:latin typeface="+mn-lt"/>
+                <a:ea typeface="+mn-ea"/>
+                <a:cs typeface="+mn-cs"/>
+              </a:defRPr>
+            </a:lvl9pPr>
+          </a:lstStyle>
+          <a:p>
+            <a:r>
+              <a:rPr lang="ru-RU" dirty="0" smtClean="0"/>
+              <a:t>Пространственно-временной </a:t>
+            </a:r>
+            <a:r>
+              <a:rPr lang="en-US" b="1" dirty="0" smtClean="0"/>
+              <a:t>A</a:t>
+            </a:r>
+            <a:r>
+              <a:rPr lang="ru-RU" b="1" dirty="0" smtClean="0"/>
+              <a:t>-</a:t>
+            </a:r>
+            <a:r>
+              <a:rPr lang="en-US" b="1" dirty="0" smtClean="0"/>
+              <a:t>Star </a:t>
+            </a:r>
+            <a:r>
+              <a:rPr lang="ru-RU" b="1" dirty="0" smtClean="0"/>
+              <a:t>с приоритетом обхода </a:t>
+            </a:r>
+            <a:r>
+              <a:rPr lang="ru-RU" dirty="0" smtClean="0"/>
+              <a:t>по заранее построенному графу эталонных маршрутов.</a:t>
+            </a:r>
+            <a:endParaRPr lang="ru-RU" dirty="0"/>
+          </a:p>
+        </p:txBody>
+      </p:sp>
     </p:spTree>
     <p:extLst>
       <p:ext uri="{BB962C8B-B14F-4D97-AF65-F5344CB8AC3E}">
-        <p14:creationId xmlns:p14="http://schemas.microsoft.com/office/powerpoint/2010/main" val="1854691686"/>
+        <p14:creationId xmlns:p14="http://schemas.microsoft.com/office/powerpoint/2010/main" val="3679270983"/>
       </p:ext>
     </p:extLst>
   </p:cSld>
@@ -6264,58 +7763,6 @@
       </p:sp>
       <p:sp>
         <p:nvSpPr>
-          <p:cNvPr id="3" name="Объект 2"/>
-          <p:cNvSpPr>
-            <a:spLocks noGrp="1"/>
-          </p:cNvSpPr>
-          <p:nvPr>
-            <p:ph idx="1"/>
-          </p:nvPr>
-        </p:nvSpPr>
-        <p:spPr>
-          <a:xfrm>
-            <a:off x="457200" y="1844825"/>
-            <a:ext cx="8229600" cy="1440160"/>
-          </a:xfrm>
-        </p:spPr>
-        <p:txBody>
-          <a:bodyPr/>
-          <a:lstStyle/>
-          <a:p>
-            <a:r>
-              <a:rPr lang="ru-RU" dirty="0"/>
-              <a:t>Пространственно-временной </a:t>
-            </a:r>
-            <a:r>
-              <a:rPr lang="en-US" b="1" dirty="0"/>
-              <a:t>A</a:t>
-            </a:r>
-            <a:r>
-              <a:rPr lang="ru-RU" b="1" dirty="0"/>
-              <a:t>-</a:t>
-            </a:r>
-            <a:r>
-              <a:rPr lang="en-US" b="1" dirty="0"/>
-              <a:t>Star</a:t>
-            </a:r>
-            <a:r>
-              <a:rPr lang="en-US" dirty="0"/>
-              <a:t> </a:t>
-            </a:r>
-            <a:r>
-              <a:rPr lang="ru-RU" dirty="0"/>
-              <a:t>с ориентацией на заранее построенный граф эталонных маршрутов</a:t>
-            </a:r>
-            <a:r>
-              <a:rPr lang="ru-RU" dirty="0" smtClean="0"/>
-              <a:t>.</a:t>
-            </a:r>
-            <a:endParaRPr lang="ru-RU" dirty="0"/>
-          </a:p>
-        </p:txBody>
-      </p:sp>
-      <p:sp>
-        <p:nvSpPr>
           <p:cNvPr id="8" name="TextBox 7"/>
           <p:cNvSpPr txBox="1"/>
           <p:nvPr/>
@@ -6348,40 +7795,444 @@
           </a:p>
         </p:txBody>
       </p:sp>
+      <p:sp>
+        <p:nvSpPr>
+          <p:cNvPr id="7" name="Объект 2"/>
+          <p:cNvSpPr txBox="1">
+            <a:spLocks/>
+          </p:cNvSpPr>
+          <p:nvPr/>
+        </p:nvSpPr>
+        <p:spPr bwMode="auto">
+          <a:xfrm>
+            <a:off x="619944" y="1928105"/>
+            <a:ext cx="4320480" cy="1500895"/>
+          </a:xfrm>
+          <a:prstGeom prst="rect">
+            <a:avLst/>
+          </a:prstGeom>
+          <a:noFill/>
+          <a:ln w="9525">
+            <a:noFill/>
+            <a:miter lim="800000"/>
+            <a:headEnd/>
+            <a:tailEnd/>
+          </a:ln>
+        </p:spPr>
+        <p:txBody>
+          <a:bodyPr vert="horz" wrap="square" lIns="91440" tIns="45720" rIns="91440" bIns="45720" numCol="1" anchor="t" anchorCtr="0" compatLnSpc="1">
+            <a:prstTxWarp prst="textNoShape">
+              <a:avLst/>
+            </a:prstTxWarp>
+          </a:bodyPr>
+          <a:lstStyle>
+            <a:lvl1pPr marL="342900" indent="-342900" algn="l" rtl="0" fontAlgn="base">
+              <a:spcBef>
+                <a:spcPct val="20000"/>
+              </a:spcBef>
+              <a:spcAft>
+                <a:spcPct val="0"/>
+              </a:spcAft>
+              <a:buFont typeface="Arial" charset="0"/>
+              <a:buChar char="•"/>
+              <a:defRPr sz="3000" kern="1200">
+                <a:solidFill>
+                  <a:schemeClr val="tx1"/>
+                </a:solidFill>
+                <a:latin typeface="+mn-lt"/>
+                <a:ea typeface="+mn-ea"/>
+                <a:cs typeface="+mn-cs"/>
+              </a:defRPr>
+            </a:lvl1pPr>
+            <a:lvl2pPr marL="742950" indent="-285750" algn="l" rtl="0" fontAlgn="base">
+              <a:spcBef>
+                <a:spcPct val="20000"/>
+              </a:spcBef>
+              <a:spcAft>
+                <a:spcPct val="0"/>
+              </a:spcAft>
+              <a:buFont typeface="Arial" charset="0"/>
+              <a:buChar char="–"/>
+              <a:defRPr sz="2600" kern="1200">
+                <a:solidFill>
+                  <a:schemeClr val="tx1"/>
+                </a:solidFill>
+                <a:latin typeface="+mn-lt"/>
+                <a:ea typeface="+mn-ea"/>
+                <a:cs typeface="+mn-cs"/>
+              </a:defRPr>
+            </a:lvl2pPr>
+            <a:lvl3pPr marL="1143000" indent="-228600" algn="l" rtl="0" fontAlgn="base">
+              <a:spcBef>
+                <a:spcPct val="20000"/>
+              </a:spcBef>
+              <a:spcAft>
+                <a:spcPct val="0"/>
+              </a:spcAft>
+              <a:buFont typeface="Arial" charset="0"/>
+              <a:buChar char="•"/>
+              <a:defRPr sz="2400" kern="1200">
+                <a:solidFill>
+                  <a:schemeClr val="tx1"/>
+                </a:solidFill>
+                <a:latin typeface="+mn-lt"/>
+                <a:ea typeface="+mn-ea"/>
+                <a:cs typeface="+mn-cs"/>
+              </a:defRPr>
+            </a:lvl3pPr>
+            <a:lvl4pPr marL="1600200" indent="-228600" algn="l" rtl="0" fontAlgn="base">
+              <a:spcBef>
+                <a:spcPct val="20000"/>
+              </a:spcBef>
+              <a:spcAft>
+                <a:spcPct val="0"/>
+              </a:spcAft>
+              <a:buFont typeface="Arial" charset="0"/>
+              <a:buChar char="–"/>
+              <a:defRPr sz="2000" kern="1200">
+                <a:solidFill>
+                  <a:schemeClr val="tx1"/>
+                </a:solidFill>
+                <a:latin typeface="+mn-lt"/>
+                <a:ea typeface="+mn-ea"/>
+                <a:cs typeface="+mn-cs"/>
+              </a:defRPr>
+            </a:lvl4pPr>
+            <a:lvl5pPr marL="2057400" indent="-228600" algn="l" rtl="0" fontAlgn="base">
+              <a:spcBef>
+                <a:spcPct val="20000"/>
+              </a:spcBef>
+              <a:spcAft>
+                <a:spcPct val="0"/>
+              </a:spcAft>
+              <a:buFont typeface="Arial" charset="0"/>
+              <a:buChar char="»"/>
+              <a:defRPr sz="2000" kern="1200">
+                <a:solidFill>
+                  <a:schemeClr val="tx1"/>
+                </a:solidFill>
+                <a:latin typeface="+mn-lt"/>
+                <a:ea typeface="+mn-ea"/>
+                <a:cs typeface="+mn-cs"/>
+              </a:defRPr>
+            </a:lvl5pPr>
+            <a:lvl6pPr marL="2514600" indent="-228600" algn="l" defTabSz="914400" rtl="0" eaLnBrk="1" latinLnBrk="0" hangingPunct="1">
+              <a:spcBef>
+                <a:spcPct val="20000"/>
+              </a:spcBef>
+              <a:buFont typeface="Arial" pitchFamily="34" charset="0"/>
+              <a:buChar char="•"/>
+              <a:defRPr sz="2000" kern="1200">
+                <a:solidFill>
+                  <a:schemeClr val="tx1"/>
+                </a:solidFill>
+                <a:latin typeface="+mn-lt"/>
+                <a:ea typeface="+mn-ea"/>
+                <a:cs typeface="+mn-cs"/>
+              </a:defRPr>
+            </a:lvl6pPr>
+            <a:lvl7pPr marL="2971800" indent="-228600" algn="l" defTabSz="914400" rtl="0" eaLnBrk="1" latinLnBrk="0" hangingPunct="1">
+              <a:spcBef>
+                <a:spcPct val="20000"/>
+              </a:spcBef>
+              <a:buFont typeface="Arial" pitchFamily="34" charset="0"/>
+              <a:buChar char="•"/>
+              <a:defRPr sz="2000" kern="1200">
+                <a:solidFill>
+                  <a:schemeClr val="tx1"/>
+                </a:solidFill>
+                <a:latin typeface="+mn-lt"/>
+                <a:ea typeface="+mn-ea"/>
+                <a:cs typeface="+mn-cs"/>
+              </a:defRPr>
+            </a:lvl7pPr>
+            <a:lvl8pPr marL="3429000" indent="-228600" algn="l" defTabSz="914400" rtl="0" eaLnBrk="1" latinLnBrk="0" hangingPunct="1">
+              <a:spcBef>
+                <a:spcPct val="20000"/>
+              </a:spcBef>
+              <a:buFont typeface="Arial" pitchFamily="34" charset="0"/>
+              <a:buChar char="•"/>
+              <a:defRPr sz="2000" kern="1200">
+                <a:solidFill>
+                  <a:schemeClr val="tx1"/>
+                </a:solidFill>
+                <a:latin typeface="+mn-lt"/>
+                <a:ea typeface="+mn-ea"/>
+                <a:cs typeface="+mn-cs"/>
+              </a:defRPr>
+            </a:lvl8pPr>
+            <a:lvl9pPr marL="3886200" indent="-228600" algn="l" defTabSz="914400" rtl="0" eaLnBrk="1" latinLnBrk="0" hangingPunct="1">
+              <a:spcBef>
+                <a:spcPct val="20000"/>
+              </a:spcBef>
+              <a:buFont typeface="Arial" pitchFamily="34" charset="0"/>
+              <a:buChar char="•"/>
+              <a:defRPr sz="2000" kern="1200">
+                <a:solidFill>
+                  <a:schemeClr val="tx1"/>
+                </a:solidFill>
+                <a:latin typeface="+mn-lt"/>
+                <a:ea typeface="+mn-ea"/>
+                <a:cs typeface="+mn-cs"/>
+              </a:defRPr>
+            </a:lvl9pPr>
+          </a:lstStyle>
+          <a:p>
+            <a:r>
+              <a:rPr lang="ru-RU" dirty="0" smtClean="0"/>
+              <a:t>Граф эталонных маршрутов построен по алгоритму </a:t>
+            </a:r>
+            <a:r>
+              <a:rPr lang="ru-RU" dirty="0" err="1" smtClean="0"/>
+              <a:t>Флойда</a:t>
+            </a:r>
+            <a:r>
+              <a:rPr lang="ru-RU" dirty="0" smtClean="0"/>
+              <a:t>.</a:t>
+            </a:r>
+            <a:endParaRPr lang="ru-RU" dirty="0"/>
+          </a:p>
+        </p:txBody>
+      </p:sp>
       <p:pic>
         <p:nvPicPr>
-          <p:cNvPr id="5" name="Рисунок 4"/>
+          <p:cNvPr id="3" name="Рисунок 2"/>
           <p:cNvPicPr>
             <a:picLocks noChangeAspect="1"/>
           </p:cNvPicPr>
           <p:nvPr/>
         </p:nvPicPr>
         <p:blipFill>
-          <a:blip r:embed="rId2">
-            <a:extLst>
-              <a:ext uri="{28A0092B-C50C-407E-A947-70E740481C1C}">
-                <a14:useLocalDpi xmlns:a14="http://schemas.microsoft.com/office/drawing/2010/main" val="0"/>
-              </a:ext>
-            </a:extLst>
-          </a:blip>
+          <a:blip r:embed="rId3"/>
           <a:stretch>
             <a:fillRect/>
           </a:stretch>
         </p:blipFill>
         <p:spPr>
           <a:xfrm>
-            <a:off x="1771997" y="3284985"/>
-            <a:ext cx="5600006" cy="3553250"/>
+            <a:off x="801466" y="3573016"/>
+            <a:ext cx="3962400" cy="2609850"/>
           </a:xfrm>
           <a:prstGeom prst="rect">
             <a:avLst/>
           </a:prstGeom>
         </p:spPr>
       </p:pic>
+      <p:sp>
+        <p:nvSpPr>
+          <p:cNvPr id="11" name="Объект 2"/>
+          <p:cNvSpPr txBox="1">
+            <a:spLocks/>
+          </p:cNvSpPr>
+          <p:nvPr/>
+        </p:nvSpPr>
+        <p:spPr bwMode="auto">
+          <a:xfrm>
+            <a:off x="4788024" y="1628800"/>
+            <a:ext cx="4536504" cy="4281339"/>
+          </a:xfrm>
+          <a:prstGeom prst="rect">
+            <a:avLst/>
+          </a:prstGeom>
+          <a:noFill/>
+          <a:ln w="9525">
+            <a:noFill/>
+            <a:miter lim="800000"/>
+            <a:headEnd/>
+            <a:tailEnd/>
+          </a:ln>
+        </p:spPr>
+        <p:txBody>
+          <a:bodyPr vert="horz" wrap="square" lIns="91440" tIns="45720" rIns="91440" bIns="45720" numCol="1" anchor="t" anchorCtr="0" compatLnSpc="1">
+            <a:prstTxWarp prst="textNoShape">
+              <a:avLst/>
+            </a:prstTxWarp>
+          </a:bodyPr>
+          <a:lstStyle>
+            <a:lvl1pPr marL="342900" indent="-342900" algn="l" rtl="0" fontAlgn="base">
+              <a:spcBef>
+                <a:spcPct val="20000"/>
+              </a:spcBef>
+              <a:spcAft>
+                <a:spcPct val="0"/>
+              </a:spcAft>
+              <a:buFont typeface="Arial" charset="0"/>
+              <a:buChar char="•"/>
+              <a:defRPr sz="3000" kern="1200">
+                <a:solidFill>
+                  <a:schemeClr val="tx1"/>
+                </a:solidFill>
+                <a:latin typeface="+mn-lt"/>
+                <a:ea typeface="+mn-ea"/>
+                <a:cs typeface="+mn-cs"/>
+              </a:defRPr>
+            </a:lvl1pPr>
+            <a:lvl2pPr marL="742950" indent="-285750" algn="l" rtl="0" fontAlgn="base">
+              <a:spcBef>
+                <a:spcPct val="20000"/>
+              </a:spcBef>
+              <a:spcAft>
+                <a:spcPct val="0"/>
+              </a:spcAft>
+              <a:buFont typeface="Arial" charset="0"/>
+              <a:buChar char="–"/>
+              <a:defRPr sz="2600" kern="1200">
+                <a:solidFill>
+                  <a:schemeClr val="tx1"/>
+                </a:solidFill>
+                <a:latin typeface="+mn-lt"/>
+                <a:ea typeface="+mn-ea"/>
+                <a:cs typeface="+mn-cs"/>
+              </a:defRPr>
+            </a:lvl2pPr>
+            <a:lvl3pPr marL="1143000" indent="-228600" algn="l" rtl="0" fontAlgn="base">
+              <a:spcBef>
+                <a:spcPct val="20000"/>
+              </a:spcBef>
+              <a:spcAft>
+                <a:spcPct val="0"/>
+              </a:spcAft>
+              <a:buFont typeface="Arial" charset="0"/>
+              <a:buChar char="•"/>
+              <a:defRPr sz="2400" kern="1200">
+                <a:solidFill>
+                  <a:schemeClr val="tx1"/>
+                </a:solidFill>
+                <a:latin typeface="+mn-lt"/>
+                <a:ea typeface="+mn-ea"/>
+                <a:cs typeface="+mn-cs"/>
+              </a:defRPr>
+            </a:lvl3pPr>
+            <a:lvl4pPr marL="1600200" indent="-228600" algn="l" rtl="0" fontAlgn="base">
+              <a:spcBef>
+                <a:spcPct val="20000"/>
+              </a:spcBef>
+              <a:spcAft>
+                <a:spcPct val="0"/>
+              </a:spcAft>
+              <a:buFont typeface="Arial" charset="0"/>
+              <a:buChar char="–"/>
+              <a:defRPr sz="2000" kern="1200">
+                <a:solidFill>
+                  <a:schemeClr val="tx1"/>
+                </a:solidFill>
+                <a:latin typeface="+mn-lt"/>
+                <a:ea typeface="+mn-ea"/>
+                <a:cs typeface="+mn-cs"/>
+              </a:defRPr>
+            </a:lvl4pPr>
+            <a:lvl5pPr marL="2057400" indent="-228600" algn="l" rtl="0" fontAlgn="base">
+              <a:spcBef>
+                <a:spcPct val="20000"/>
+              </a:spcBef>
+              <a:spcAft>
+                <a:spcPct val="0"/>
+              </a:spcAft>
+              <a:buFont typeface="Arial" charset="0"/>
+              <a:buChar char="»"/>
+              <a:defRPr sz="2000" kern="1200">
+                <a:solidFill>
+                  <a:schemeClr val="tx1"/>
+                </a:solidFill>
+                <a:latin typeface="+mn-lt"/>
+                <a:ea typeface="+mn-ea"/>
+                <a:cs typeface="+mn-cs"/>
+              </a:defRPr>
+            </a:lvl5pPr>
+            <a:lvl6pPr marL="2514600" indent="-228600" algn="l" defTabSz="914400" rtl="0" eaLnBrk="1" latinLnBrk="0" hangingPunct="1">
+              <a:spcBef>
+                <a:spcPct val="20000"/>
+              </a:spcBef>
+              <a:buFont typeface="Arial" pitchFamily="34" charset="0"/>
+              <a:buChar char="•"/>
+              <a:defRPr sz="2000" kern="1200">
+                <a:solidFill>
+                  <a:schemeClr val="tx1"/>
+                </a:solidFill>
+                <a:latin typeface="+mn-lt"/>
+                <a:ea typeface="+mn-ea"/>
+                <a:cs typeface="+mn-cs"/>
+              </a:defRPr>
+            </a:lvl6pPr>
+            <a:lvl7pPr marL="2971800" indent="-228600" algn="l" defTabSz="914400" rtl="0" eaLnBrk="1" latinLnBrk="0" hangingPunct="1">
+              <a:spcBef>
+                <a:spcPct val="20000"/>
+              </a:spcBef>
+              <a:buFont typeface="Arial" pitchFamily="34" charset="0"/>
+              <a:buChar char="•"/>
+              <a:defRPr sz="2000" kern="1200">
+                <a:solidFill>
+                  <a:schemeClr val="tx1"/>
+                </a:solidFill>
+                <a:latin typeface="+mn-lt"/>
+                <a:ea typeface="+mn-ea"/>
+                <a:cs typeface="+mn-cs"/>
+              </a:defRPr>
+            </a:lvl7pPr>
+            <a:lvl8pPr marL="3429000" indent="-228600" algn="l" defTabSz="914400" rtl="0" eaLnBrk="1" latinLnBrk="0" hangingPunct="1">
+              <a:spcBef>
+                <a:spcPct val="20000"/>
+              </a:spcBef>
+              <a:buFont typeface="Arial" pitchFamily="34" charset="0"/>
+              <a:buChar char="•"/>
+              <a:defRPr sz="2000" kern="1200">
+                <a:solidFill>
+                  <a:schemeClr val="tx1"/>
+                </a:solidFill>
+                <a:latin typeface="+mn-lt"/>
+                <a:ea typeface="+mn-ea"/>
+                <a:cs typeface="+mn-cs"/>
+              </a:defRPr>
+            </a:lvl8pPr>
+            <a:lvl9pPr marL="3886200" indent="-228600" algn="l" defTabSz="914400" rtl="0" eaLnBrk="1" latinLnBrk="0" hangingPunct="1">
+              <a:spcBef>
+                <a:spcPct val="20000"/>
+              </a:spcBef>
+              <a:buFont typeface="Arial" pitchFamily="34" charset="0"/>
+              <a:buChar char="•"/>
+              <a:defRPr sz="2000" kern="1200">
+                <a:solidFill>
+                  <a:schemeClr val="tx1"/>
+                </a:solidFill>
+                <a:latin typeface="+mn-lt"/>
+                <a:ea typeface="+mn-ea"/>
+                <a:cs typeface="+mn-cs"/>
+              </a:defRPr>
+            </a:lvl9pPr>
+          </a:lstStyle>
+          <a:p>
+            <a:r>
+              <a:rPr lang="ru-RU" dirty="0" smtClean="0"/>
+              <a:t>Пространственно-временной </a:t>
+            </a:r>
+            <a:r>
+              <a:rPr lang="en-US" dirty="0" smtClean="0"/>
+              <a:t>A</a:t>
+            </a:r>
+            <a:r>
+              <a:rPr lang="ru-RU" dirty="0" smtClean="0"/>
+              <a:t>-</a:t>
+            </a:r>
+            <a:r>
+              <a:rPr lang="en-US" dirty="0" smtClean="0"/>
+              <a:t>Star </a:t>
+            </a:r>
+            <a:r>
+              <a:rPr lang="ru-RU" dirty="0" smtClean="0"/>
+              <a:t>приоритетом обхода по </a:t>
+            </a:r>
+            <a:r>
+              <a:rPr lang="ru-RU" b="1" dirty="0" smtClean="0"/>
+              <a:t>заранее построенному графу эталонных маршрутов.</a:t>
+            </a:r>
+            <a:endParaRPr lang="ru-RU" b="1" dirty="0"/>
+          </a:p>
+        </p:txBody>
+      </p:sp>
     </p:spTree>
     <p:extLst>
       <p:ext uri="{BB962C8B-B14F-4D97-AF65-F5344CB8AC3E}">
-        <p14:creationId xmlns:p14="http://schemas.microsoft.com/office/powerpoint/2010/main" val="3679270983"/>
+        <p14:creationId xmlns:p14="http://schemas.microsoft.com/office/powerpoint/2010/main" val="595026442"/>
       </p:ext>
     </p:extLst>
   </p:cSld>
@@ -6448,15 +8299,21 @@
           </p:nvPr>
         </p:nvPicPr>
         <p:blipFill>
-          <a:blip r:embed="rId2"/>
+          <a:blip r:embed="rId3">
+            <a:extLst>
+              <a:ext uri="{28A0092B-C50C-407E-A947-70E740481C1C}">
+                <a14:useLocalDpi xmlns:a14="http://schemas.microsoft.com/office/drawing/2010/main" val="0"/>
+              </a:ext>
+            </a:extLst>
+          </a:blip>
           <a:stretch>
             <a:fillRect/>
           </a:stretch>
         </p:blipFill>
         <p:spPr>
           <a:xfrm>
-            <a:off x="490251" y="2492896"/>
-            <a:ext cx="8229600" cy="3583222"/>
+            <a:off x="107505" y="2262387"/>
+            <a:ext cx="6939937" cy="4580359"/>
           </a:xfrm>
           <a:prstGeom prst="rect">
             <a:avLst/>
@@ -6500,8 +8357,8 @@
         </p:nvSpPr>
         <p:spPr>
           <a:xfrm>
-            <a:off x="1285852" y="1553446"/>
-            <a:ext cx="6211380" cy="553998"/>
+            <a:off x="1378626" y="1174962"/>
+            <a:ext cx="6386748" cy="553998"/>
           </a:xfrm>
           <a:prstGeom prst="rect">
             <a:avLst/>
@@ -6515,22 +8372,22 @@
           <a:lstStyle/>
           <a:p>
             <a:r>
+              <a:rPr lang="ru-RU" sz="3000" dirty="0">
+                <a:latin typeface="+mj-lt"/>
+              </a:rPr>
+              <a:t>Х</a:t>
+            </a:r>
+            <a:r>
               <a:rPr lang="ru-RU" sz="3000" dirty="0" smtClean="0">
                 <a:latin typeface="+mj-lt"/>
               </a:rPr>
-              <a:t>Главное из </a:t>
-            </a:r>
-            <a:r>
-              <a:rPr lang="en-US" sz="3000" dirty="0" smtClean="0">
-                <a:latin typeface="+mj-lt"/>
-              </a:rPr>
-              <a:t>UML </a:t>
+              <a:t>ранени</a:t>
             </a:r>
             <a:r>
               <a:rPr lang="ru-RU" sz="3000" dirty="0" smtClean="0">
                 <a:latin typeface="+mj-lt"/>
               </a:rPr>
-              <a:t>диаграммы проекта</a:t>
+              <a:t>е истории движения машины</a:t>
             </a:r>
             <a:endParaRPr lang="ru-RU" sz="3000" dirty="0">
               <a:latin typeface="+mj-lt"/>
@@ -6538,7 +8395,219 @@
           </a:p>
         </p:txBody>
       </p:sp>
+      <p:sp>
+        <p:nvSpPr>
+          <p:cNvPr id="9" name="Объект 2"/>
+          <p:cNvSpPr txBox="1">
+            <a:spLocks/>
+          </p:cNvSpPr>
+          <p:nvPr/>
+        </p:nvSpPr>
+        <p:spPr bwMode="auto">
+          <a:xfrm>
+            <a:off x="4716016" y="1628800"/>
+            <a:ext cx="4536504" cy="4281339"/>
+          </a:xfrm>
+          <a:prstGeom prst="rect">
+            <a:avLst/>
+          </a:prstGeom>
+          <a:noFill/>
+          <a:ln w="9525">
+            <a:noFill/>
+            <a:miter lim="800000"/>
+            <a:headEnd/>
+            <a:tailEnd/>
+          </a:ln>
+        </p:spPr>
+        <p:txBody>
+          <a:bodyPr vert="horz" wrap="square" lIns="91440" tIns="45720" rIns="91440" bIns="45720" numCol="1" anchor="t" anchorCtr="0" compatLnSpc="1">
+            <a:prstTxWarp prst="textNoShape">
+              <a:avLst/>
+            </a:prstTxWarp>
+          </a:bodyPr>
+          <a:lstStyle>
+            <a:lvl1pPr marL="342900" indent="-342900" algn="l" rtl="0" fontAlgn="base">
+              <a:spcBef>
+                <a:spcPct val="20000"/>
+              </a:spcBef>
+              <a:spcAft>
+                <a:spcPct val="0"/>
+              </a:spcAft>
+              <a:buFont typeface="Arial" charset="0"/>
+              <a:buChar char="•"/>
+              <a:defRPr sz="3000" kern="1200">
+                <a:solidFill>
+                  <a:schemeClr val="tx1"/>
+                </a:solidFill>
+                <a:latin typeface="+mn-lt"/>
+                <a:ea typeface="+mn-ea"/>
+                <a:cs typeface="+mn-cs"/>
+              </a:defRPr>
+            </a:lvl1pPr>
+            <a:lvl2pPr marL="742950" indent="-285750" algn="l" rtl="0" fontAlgn="base">
+              <a:spcBef>
+                <a:spcPct val="20000"/>
+              </a:spcBef>
+              <a:spcAft>
+                <a:spcPct val="0"/>
+              </a:spcAft>
+              <a:buFont typeface="Arial" charset="0"/>
+              <a:buChar char="–"/>
+              <a:defRPr sz="2600" kern="1200">
+                <a:solidFill>
+                  <a:schemeClr val="tx1"/>
+                </a:solidFill>
+                <a:latin typeface="+mn-lt"/>
+                <a:ea typeface="+mn-ea"/>
+                <a:cs typeface="+mn-cs"/>
+              </a:defRPr>
+            </a:lvl2pPr>
+            <a:lvl3pPr marL="1143000" indent="-228600" algn="l" rtl="0" fontAlgn="base">
+              <a:spcBef>
+                <a:spcPct val="20000"/>
+              </a:spcBef>
+              <a:spcAft>
+                <a:spcPct val="0"/>
+              </a:spcAft>
+              <a:buFont typeface="Arial" charset="0"/>
+              <a:buChar char="•"/>
+              <a:defRPr sz="2400" kern="1200">
+                <a:solidFill>
+                  <a:schemeClr val="tx1"/>
+                </a:solidFill>
+                <a:latin typeface="+mn-lt"/>
+                <a:ea typeface="+mn-ea"/>
+                <a:cs typeface="+mn-cs"/>
+              </a:defRPr>
+            </a:lvl3pPr>
+            <a:lvl4pPr marL="1600200" indent="-228600" algn="l" rtl="0" fontAlgn="base">
+              <a:spcBef>
+                <a:spcPct val="20000"/>
+              </a:spcBef>
+              <a:spcAft>
+                <a:spcPct val="0"/>
+              </a:spcAft>
+              <a:buFont typeface="Arial" charset="0"/>
+              <a:buChar char="–"/>
+              <a:defRPr sz="2000" kern="1200">
+                <a:solidFill>
+                  <a:schemeClr val="tx1"/>
+                </a:solidFill>
+                <a:latin typeface="+mn-lt"/>
+                <a:ea typeface="+mn-ea"/>
+                <a:cs typeface="+mn-cs"/>
+              </a:defRPr>
+            </a:lvl4pPr>
+            <a:lvl5pPr marL="2057400" indent="-228600" algn="l" rtl="0" fontAlgn="base">
+              <a:spcBef>
+                <a:spcPct val="20000"/>
+              </a:spcBef>
+              <a:spcAft>
+                <a:spcPct val="0"/>
+              </a:spcAft>
+              <a:buFont typeface="Arial" charset="0"/>
+              <a:buChar char="»"/>
+              <a:defRPr sz="2000" kern="1200">
+                <a:solidFill>
+                  <a:schemeClr val="tx1"/>
+                </a:solidFill>
+                <a:latin typeface="+mn-lt"/>
+                <a:ea typeface="+mn-ea"/>
+                <a:cs typeface="+mn-cs"/>
+              </a:defRPr>
+            </a:lvl5pPr>
+            <a:lvl6pPr marL="2514600" indent="-228600" algn="l" defTabSz="914400" rtl="0" eaLnBrk="1" latinLnBrk="0" hangingPunct="1">
+              <a:spcBef>
+                <a:spcPct val="20000"/>
+              </a:spcBef>
+              <a:buFont typeface="Arial" pitchFamily="34" charset="0"/>
+              <a:buChar char="•"/>
+              <a:defRPr sz="2000" kern="1200">
+                <a:solidFill>
+                  <a:schemeClr val="tx1"/>
+                </a:solidFill>
+                <a:latin typeface="+mn-lt"/>
+                <a:ea typeface="+mn-ea"/>
+                <a:cs typeface="+mn-cs"/>
+              </a:defRPr>
+            </a:lvl6pPr>
+            <a:lvl7pPr marL="2971800" indent="-228600" algn="l" defTabSz="914400" rtl="0" eaLnBrk="1" latinLnBrk="0" hangingPunct="1">
+              <a:spcBef>
+                <a:spcPct val="20000"/>
+              </a:spcBef>
+              <a:buFont typeface="Arial" pitchFamily="34" charset="0"/>
+              <a:buChar char="•"/>
+              <a:defRPr sz="2000" kern="1200">
+                <a:solidFill>
+                  <a:schemeClr val="tx1"/>
+                </a:solidFill>
+                <a:latin typeface="+mn-lt"/>
+                <a:ea typeface="+mn-ea"/>
+                <a:cs typeface="+mn-cs"/>
+              </a:defRPr>
+            </a:lvl7pPr>
+            <a:lvl8pPr marL="3429000" indent="-228600" algn="l" defTabSz="914400" rtl="0" eaLnBrk="1" latinLnBrk="0" hangingPunct="1">
+              <a:spcBef>
+                <a:spcPct val="20000"/>
+              </a:spcBef>
+              <a:buFont typeface="Arial" pitchFamily="34" charset="0"/>
+              <a:buChar char="•"/>
+              <a:defRPr sz="2000" kern="1200">
+                <a:solidFill>
+                  <a:schemeClr val="tx1"/>
+                </a:solidFill>
+                <a:latin typeface="+mn-lt"/>
+                <a:ea typeface="+mn-ea"/>
+                <a:cs typeface="+mn-cs"/>
+              </a:defRPr>
+            </a:lvl8pPr>
+            <a:lvl9pPr marL="3886200" indent="-228600" algn="l" defTabSz="914400" rtl="0" eaLnBrk="1" latinLnBrk="0" hangingPunct="1">
+              <a:spcBef>
+                <a:spcPct val="20000"/>
+              </a:spcBef>
+              <a:buFont typeface="Arial" pitchFamily="34" charset="0"/>
+              <a:buChar char="•"/>
+              <a:defRPr sz="2000" kern="1200">
+                <a:solidFill>
+                  <a:schemeClr val="tx1"/>
+                </a:solidFill>
+                <a:latin typeface="+mn-lt"/>
+                <a:ea typeface="+mn-ea"/>
+                <a:cs typeface="+mn-cs"/>
+              </a:defRPr>
+            </a:lvl9pPr>
+          </a:lstStyle>
+          <a:p>
+            <a:r>
+              <a:rPr lang="ru-RU" b="1" dirty="0" smtClean="0"/>
+              <a:t>Пространственно-временной </a:t>
+            </a:r>
+            <a:r>
+              <a:rPr lang="en-US" b="1" dirty="0" smtClean="0"/>
+              <a:t>A</a:t>
+            </a:r>
+            <a:r>
+              <a:rPr lang="ru-RU" b="1" dirty="0" smtClean="0"/>
+              <a:t>-</a:t>
+            </a:r>
+            <a:r>
+              <a:rPr lang="en-US" b="1" dirty="0" smtClean="0"/>
+              <a:t>Star </a:t>
+            </a:r>
+            <a:r>
+              <a:rPr lang="ru-RU" b="1" dirty="0" smtClean="0"/>
+              <a:t>приоритетом обхода по заранее построенному графу эталонных маршрутов.</a:t>
+            </a:r>
+            <a:endParaRPr lang="ru-RU" b="1" dirty="0"/>
+          </a:p>
+        </p:txBody>
+      </p:sp>
     </p:spTree>
+    <p:extLst>
+      <p:ext uri="{BB962C8B-B14F-4D97-AF65-F5344CB8AC3E}">
+        <p14:creationId xmlns:p14="http://schemas.microsoft.com/office/powerpoint/2010/main" val="3676557483"/>
+      </p:ext>
+    </p:extLst>
   </p:cSld>
   <p:clrMapOvr>
     <a:masterClrMapping/>

</xml_diff>